<commit_message>
update Zusammenfassung und Präsentation
</commit_message>
<xml_diff>
--- a/Von der Informatik die Auszog um die Welt.pptx
+++ b/Von der Informatik die Auszog um die Welt.pptx
@@ -4,19 +4,28 @@
   <p:sldMasterIdLst>
     <p:sldMasterId id="2147483648" r:id="rId1"/>
   </p:sldMasterIdLst>
+  <p:notesMasterIdLst>
+    <p:notesMasterId r:id="rId20"/>
+  </p:notesMasterIdLst>
   <p:sldIdLst>
     <p:sldId id="256" r:id="rId2"/>
     <p:sldId id="257" r:id="rId3"/>
     <p:sldId id="259" r:id="rId4"/>
     <p:sldId id="258" r:id="rId5"/>
     <p:sldId id="262" r:id="rId6"/>
-    <p:sldId id="263" r:id="rId7"/>
-    <p:sldId id="260" r:id="rId8"/>
-    <p:sldId id="264" r:id="rId9"/>
-    <p:sldId id="265" r:id="rId10"/>
-    <p:sldId id="266" r:id="rId11"/>
-    <p:sldId id="267" r:id="rId12"/>
-    <p:sldId id="268" r:id="rId13"/>
+    <p:sldId id="273" r:id="rId7"/>
+    <p:sldId id="271" r:id="rId8"/>
+    <p:sldId id="272" r:id="rId9"/>
+    <p:sldId id="260" r:id="rId10"/>
+    <p:sldId id="274" r:id="rId11"/>
+    <p:sldId id="275" r:id="rId12"/>
+    <p:sldId id="276" r:id="rId13"/>
+    <p:sldId id="263" r:id="rId14"/>
+    <p:sldId id="264" r:id="rId15"/>
+    <p:sldId id="265" r:id="rId16"/>
+    <p:sldId id="266" r:id="rId17"/>
+    <p:sldId id="267" r:id="rId18"/>
+    <p:sldId id="268" r:id="rId19"/>
   </p:sldIdLst>
   <p:sldSz cx="12192000" cy="6858000"/>
   <p:notesSz cx="6858000" cy="9144000"/>
@@ -115,7 +124,458 @@
       </a:defRPr>
     </a:lvl9pPr>
   </p:defaultTextStyle>
+  <p:extLst>
+    <p:ext uri="{EFAFB233-063F-42B5-8137-9DF3F51BA10A}">
+      <p15:sldGuideLst xmlns:p15="http://schemas.microsoft.com/office/powerpoint/2012/main"/>
+    </p:ext>
+  </p:extLst>
 </p:presentation>
+</file>
+
+<file path=ppt/notesMasters/notesMaster1.xml><?xml version="1.0" encoding="utf-8"?>
+<p:notesMaster xmlns:a="http://schemas.openxmlformats.org/drawingml/2006/main" xmlns:r="http://schemas.openxmlformats.org/officeDocument/2006/relationships" xmlns:p="http://schemas.openxmlformats.org/presentationml/2006/main">
+  <p:cSld>
+    <p:bg>
+      <p:bgRef idx="1001">
+        <a:schemeClr val="bg1"/>
+      </p:bgRef>
+    </p:bg>
+    <p:spTree>
+      <p:nvGrpSpPr>
+        <p:cNvPr id="1" name=""/>
+        <p:cNvGrpSpPr/>
+        <p:nvPr/>
+      </p:nvGrpSpPr>
+      <p:grpSpPr>
+        <a:xfrm>
+          <a:off x="0" y="0"/>
+          <a:ext cx="0" cy="0"/>
+          <a:chOff x="0" y="0"/>
+          <a:chExt cx="0" cy="0"/>
+        </a:xfrm>
+      </p:grpSpPr>
+      <p:sp>
+        <p:nvSpPr>
+          <p:cNvPr id="2" name="Kopfzeilenplatzhalter 1"/>
+          <p:cNvSpPr>
+            <a:spLocks noGrp="1"/>
+          </p:cNvSpPr>
+          <p:nvPr>
+            <p:ph type="hdr" sz="quarter"/>
+          </p:nvPr>
+        </p:nvSpPr>
+        <p:spPr>
+          <a:xfrm>
+            <a:off x="0" y="0"/>
+            <a:ext cx="2971800" cy="458788"/>
+          </a:xfrm>
+          <a:prstGeom prst="rect">
+            <a:avLst/>
+          </a:prstGeom>
+        </p:spPr>
+        <p:txBody>
+          <a:bodyPr vert="horz" lIns="91440" tIns="45720" rIns="91440" bIns="45720" rtlCol="0"/>
+          <a:lstStyle>
+            <a:lvl1pPr algn="l">
+              <a:defRPr sz="1200"/>
+            </a:lvl1pPr>
+          </a:lstStyle>
+          <a:p>
+            <a:endParaRPr lang="en-US"/>
+          </a:p>
+        </p:txBody>
+      </p:sp>
+      <p:sp>
+        <p:nvSpPr>
+          <p:cNvPr id="3" name="Datumsplatzhalter 2"/>
+          <p:cNvSpPr>
+            <a:spLocks noGrp="1"/>
+          </p:cNvSpPr>
+          <p:nvPr>
+            <p:ph type="dt" idx="1"/>
+          </p:nvPr>
+        </p:nvSpPr>
+        <p:spPr>
+          <a:xfrm>
+            <a:off x="3884613" y="0"/>
+            <a:ext cx="2971800" cy="458788"/>
+          </a:xfrm>
+          <a:prstGeom prst="rect">
+            <a:avLst/>
+          </a:prstGeom>
+        </p:spPr>
+        <p:txBody>
+          <a:bodyPr vert="horz" lIns="91440" tIns="45720" rIns="91440" bIns="45720" rtlCol="0"/>
+          <a:lstStyle>
+            <a:lvl1pPr algn="r">
+              <a:defRPr sz="1200"/>
+            </a:lvl1pPr>
+          </a:lstStyle>
+          <a:p>
+            <a:fld id="{875EF2D6-993B-422A-B3EE-972875259C32}" type="datetimeFigureOut">
+              <a:rPr lang="en-US" smtClean="0"/>
+              <a:t>3/27/2016</a:t>
+            </a:fld>
+            <a:endParaRPr lang="en-US"/>
+          </a:p>
+        </p:txBody>
+      </p:sp>
+      <p:sp>
+        <p:nvSpPr>
+          <p:cNvPr id="4" name="Folienbildplatzhalter 3"/>
+          <p:cNvSpPr>
+            <a:spLocks noGrp="1" noRot="1" noChangeAspect="1"/>
+          </p:cNvSpPr>
+          <p:nvPr>
+            <p:ph type="sldImg" idx="2"/>
+          </p:nvPr>
+        </p:nvSpPr>
+        <p:spPr>
+          <a:xfrm>
+            <a:off x="685800" y="1143000"/>
+            <a:ext cx="5486400" cy="3086100"/>
+          </a:xfrm>
+          <a:prstGeom prst="rect">
+            <a:avLst/>
+          </a:prstGeom>
+          <a:noFill/>
+          <a:ln w="12700">
+            <a:solidFill>
+              <a:prstClr val="black"/>
+            </a:solidFill>
+          </a:ln>
+        </p:spPr>
+        <p:txBody>
+          <a:bodyPr vert="horz" lIns="91440" tIns="45720" rIns="91440" bIns="45720" rtlCol="0" anchor="ctr"/>
+          <a:lstStyle/>
+          <a:p>
+            <a:endParaRPr lang="en-US"/>
+          </a:p>
+        </p:txBody>
+      </p:sp>
+      <p:sp>
+        <p:nvSpPr>
+          <p:cNvPr id="5" name="Notizenplatzhalter 4"/>
+          <p:cNvSpPr>
+            <a:spLocks noGrp="1"/>
+          </p:cNvSpPr>
+          <p:nvPr>
+            <p:ph type="body" sz="quarter" idx="3"/>
+          </p:nvPr>
+        </p:nvSpPr>
+        <p:spPr>
+          <a:xfrm>
+            <a:off x="685800" y="4400550"/>
+            <a:ext cx="5486400" cy="3600450"/>
+          </a:xfrm>
+          <a:prstGeom prst="rect">
+            <a:avLst/>
+          </a:prstGeom>
+        </p:spPr>
+        <p:txBody>
+          <a:bodyPr vert="horz" lIns="91440" tIns="45720" rIns="91440" bIns="45720" rtlCol="0"/>
+          <a:lstStyle/>
+          <a:p>
+            <a:pPr lvl="0"/>
+            <a:r>
+              <a:rPr lang="de-DE" smtClean="0"/>
+              <a:t>Formatvorlagen des Textmasters bearbeiten</a:t>
+            </a:r>
+          </a:p>
+          <a:p>
+            <a:pPr lvl="1"/>
+            <a:r>
+              <a:rPr lang="de-DE" smtClean="0"/>
+              <a:t>Zweite Ebene</a:t>
+            </a:r>
+          </a:p>
+          <a:p>
+            <a:pPr lvl="2"/>
+            <a:r>
+              <a:rPr lang="de-DE" smtClean="0"/>
+              <a:t>Dritte Ebene</a:t>
+            </a:r>
+          </a:p>
+          <a:p>
+            <a:pPr lvl="3"/>
+            <a:r>
+              <a:rPr lang="de-DE" smtClean="0"/>
+              <a:t>Vierte Ebene</a:t>
+            </a:r>
+          </a:p>
+          <a:p>
+            <a:pPr lvl="4"/>
+            <a:r>
+              <a:rPr lang="de-DE" smtClean="0"/>
+              <a:t>Fünfte Ebene</a:t>
+            </a:r>
+            <a:endParaRPr lang="en-US"/>
+          </a:p>
+        </p:txBody>
+      </p:sp>
+      <p:sp>
+        <p:nvSpPr>
+          <p:cNvPr id="6" name="Fußzeilenplatzhalter 5"/>
+          <p:cNvSpPr>
+            <a:spLocks noGrp="1"/>
+          </p:cNvSpPr>
+          <p:nvPr>
+            <p:ph type="ftr" sz="quarter" idx="4"/>
+          </p:nvPr>
+        </p:nvSpPr>
+        <p:spPr>
+          <a:xfrm>
+            <a:off x="0" y="8685213"/>
+            <a:ext cx="2971800" cy="458787"/>
+          </a:xfrm>
+          <a:prstGeom prst="rect">
+            <a:avLst/>
+          </a:prstGeom>
+        </p:spPr>
+        <p:txBody>
+          <a:bodyPr vert="horz" lIns="91440" tIns="45720" rIns="91440" bIns="45720" rtlCol="0" anchor="b"/>
+          <a:lstStyle>
+            <a:lvl1pPr algn="l">
+              <a:defRPr sz="1200"/>
+            </a:lvl1pPr>
+          </a:lstStyle>
+          <a:p>
+            <a:endParaRPr lang="en-US"/>
+          </a:p>
+        </p:txBody>
+      </p:sp>
+      <p:sp>
+        <p:nvSpPr>
+          <p:cNvPr id="7" name="Foliennummernplatzhalter 6"/>
+          <p:cNvSpPr>
+            <a:spLocks noGrp="1"/>
+          </p:cNvSpPr>
+          <p:nvPr>
+            <p:ph type="sldNum" sz="quarter" idx="5"/>
+          </p:nvPr>
+        </p:nvSpPr>
+        <p:spPr>
+          <a:xfrm>
+            <a:off x="3884613" y="8685213"/>
+            <a:ext cx="2971800" cy="458787"/>
+          </a:xfrm>
+          <a:prstGeom prst="rect">
+            <a:avLst/>
+          </a:prstGeom>
+        </p:spPr>
+        <p:txBody>
+          <a:bodyPr vert="horz" lIns="91440" tIns="45720" rIns="91440" bIns="45720" rtlCol="0" anchor="b"/>
+          <a:lstStyle>
+            <a:lvl1pPr algn="r">
+              <a:defRPr sz="1200"/>
+            </a:lvl1pPr>
+          </a:lstStyle>
+          <a:p>
+            <a:fld id="{C857F784-7E00-4EDA-BC2E-93D39A2A3D4A}" type="slidenum">
+              <a:rPr lang="en-US" smtClean="0"/>
+              <a:t>‹Nr.›</a:t>
+            </a:fld>
+            <a:endParaRPr lang="en-US"/>
+          </a:p>
+        </p:txBody>
+      </p:sp>
+    </p:spTree>
+    <p:extLst>
+      <p:ext uri="{BB962C8B-B14F-4D97-AF65-F5344CB8AC3E}">
+        <p14:creationId xmlns:p14="http://schemas.microsoft.com/office/powerpoint/2010/main" val="2285708915"/>
+      </p:ext>
+    </p:extLst>
+  </p:cSld>
+  <p:clrMap bg1="lt1" tx1="dk1" bg2="lt2" tx2="dk2" accent1="accent1" accent2="accent2" accent3="accent3" accent4="accent4" accent5="accent5" accent6="accent6" hlink="hlink" folHlink="folHlink"/>
+  <p:notesStyle>
+    <a:lvl1pPr marL="0" algn="l" defTabSz="914400" rtl="0" eaLnBrk="1" latinLnBrk="0" hangingPunct="1">
+      <a:defRPr sz="1200" kern="1200">
+        <a:solidFill>
+          <a:schemeClr val="tx1"/>
+        </a:solidFill>
+        <a:latin typeface="+mn-lt"/>
+        <a:ea typeface="+mn-ea"/>
+        <a:cs typeface="+mn-cs"/>
+      </a:defRPr>
+    </a:lvl1pPr>
+    <a:lvl2pPr marL="457200" algn="l" defTabSz="914400" rtl="0" eaLnBrk="1" latinLnBrk="0" hangingPunct="1">
+      <a:defRPr sz="1200" kern="1200">
+        <a:solidFill>
+          <a:schemeClr val="tx1"/>
+        </a:solidFill>
+        <a:latin typeface="+mn-lt"/>
+        <a:ea typeface="+mn-ea"/>
+        <a:cs typeface="+mn-cs"/>
+      </a:defRPr>
+    </a:lvl2pPr>
+    <a:lvl3pPr marL="914400" algn="l" defTabSz="914400" rtl="0" eaLnBrk="1" latinLnBrk="0" hangingPunct="1">
+      <a:defRPr sz="1200" kern="1200">
+        <a:solidFill>
+          <a:schemeClr val="tx1"/>
+        </a:solidFill>
+        <a:latin typeface="+mn-lt"/>
+        <a:ea typeface="+mn-ea"/>
+        <a:cs typeface="+mn-cs"/>
+      </a:defRPr>
+    </a:lvl3pPr>
+    <a:lvl4pPr marL="1371600" algn="l" defTabSz="914400" rtl="0" eaLnBrk="1" latinLnBrk="0" hangingPunct="1">
+      <a:defRPr sz="1200" kern="1200">
+        <a:solidFill>
+          <a:schemeClr val="tx1"/>
+        </a:solidFill>
+        <a:latin typeface="+mn-lt"/>
+        <a:ea typeface="+mn-ea"/>
+        <a:cs typeface="+mn-cs"/>
+      </a:defRPr>
+    </a:lvl4pPr>
+    <a:lvl5pPr marL="1828800" algn="l" defTabSz="914400" rtl="0" eaLnBrk="1" latinLnBrk="0" hangingPunct="1">
+      <a:defRPr sz="1200" kern="1200">
+        <a:solidFill>
+          <a:schemeClr val="tx1"/>
+        </a:solidFill>
+        <a:latin typeface="+mn-lt"/>
+        <a:ea typeface="+mn-ea"/>
+        <a:cs typeface="+mn-cs"/>
+      </a:defRPr>
+    </a:lvl5pPr>
+    <a:lvl6pPr marL="2286000" algn="l" defTabSz="914400" rtl="0" eaLnBrk="1" latinLnBrk="0" hangingPunct="1">
+      <a:defRPr sz="1200" kern="1200">
+        <a:solidFill>
+          <a:schemeClr val="tx1"/>
+        </a:solidFill>
+        <a:latin typeface="+mn-lt"/>
+        <a:ea typeface="+mn-ea"/>
+        <a:cs typeface="+mn-cs"/>
+      </a:defRPr>
+    </a:lvl6pPr>
+    <a:lvl7pPr marL="2743200" algn="l" defTabSz="914400" rtl="0" eaLnBrk="1" latinLnBrk="0" hangingPunct="1">
+      <a:defRPr sz="1200" kern="1200">
+        <a:solidFill>
+          <a:schemeClr val="tx1"/>
+        </a:solidFill>
+        <a:latin typeface="+mn-lt"/>
+        <a:ea typeface="+mn-ea"/>
+        <a:cs typeface="+mn-cs"/>
+      </a:defRPr>
+    </a:lvl7pPr>
+    <a:lvl8pPr marL="3200400" algn="l" defTabSz="914400" rtl="0" eaLnBrk="1" latinLnBrk="0" hangingPunct="1">
+      <a:defRPr sz="1200" kern="1200">
+        <a:solidFill>
+          <a:schemeClr val="tx1"/>
+        </a:solidFill>
+        <a:latin typeface="+mn-lt"/>
+        <a:ea typeface="+mn-ea"/>
+        <a:cs typeface="+mn-cs"/>
+      </a:defRPr>
+    </a:lvl8pPr>
+    <a:lvl9pPr marL="3657600" algn="l" defTabSz="914400" rtl="0" eaLnBrk="1" latinLnBrk="0" hangingPunct="1">
+      <a:defRPr sz="1200" kern="1200">
+        <a:solidFill>
+          <a:schemeClr val="tx1"/>
+        </a:solidFill>
+        <a:latin typeface="+mn-lt"/>
+        <a:ea typeface="+mn-ea"/>
+        <a:cs typeface="+mn-cs"/>
+      </a:defRPr>
+    </a:lvl9pPr>
+  </p:notesStyle>
+</p:notesMaster>
+</file>
+
+<file path=ppt/notesSlides/notesSlide1.xml><?xml version="1.0" encoding="utf-8"?>
+<p:notes xmlns:a="http://schemas.openxmlformats.org/drawingml/2006/main" xmlns:r="http://schemas.openxmlformats.org/officeDocument/2006/relationships" xmlns:p="http://schemas.openxmlformats.org/presentationml/2006/main">
+  <p:cSld>
+    <p:spTree>
+      <p:nvGrpSpPr>
+        <p:cNvPr id="1" name=""/>
+        <p:cNvGrpSpPr/>
+        <p:nvPr/>
+      </p:nvGrpSpPr>
+      <p:grpSpPr>
+        <a:xfrm>
+          <a:off x="0" y="0"/>
+          <a:ext cx="0" cy="0"/>
+          <a:chOff x="0" y="0"/>
+          <a:chExt cx="0" cy="0"/>
+        </a:xfrm>
+      </p:grpSpPr>
+      <p:sp>
+        <p:nvSpPr>
+          <p:cNvPr id="2" name="Folienbildplatzhalter 1"/>
+          <p:cNvSpPr>
+            <a:spLocks noGrp="1" noRot="1" noChangeAspect="1"/>
+          </p:cNvSpPr>
+          <p:nvPr>
+            <p:ph type="sldImg"/>
+          </p:nvPr>
+        </p:nvSpPr>
+        <p:spPr/>
+      </p:sp>
+      <p:sp>
+        <p:nvSpPr>
+          <p:cNvPr id="3" name="Notizenplatzhalter 2"/>
+          <p:cNvSpPr>
+            <a:spLocks noGrp="1"/>
+          </p:cNvSpPr>
+          <p:nvPr>
+            <p:ph type="body" idx="1"/>
+          </p:nvPr>
+        </p:nvSpPr>
+        <p:spPr/>
+        <p:txBody>
+          <a:bodyPr/>
+          <a:lstStyle/>
+          <a:p>
+            <a:r>
+              <a:rPr lang="de-AT" dirty="0" smtClean="0"/>
+              <a:t>Alle Gene bilden den </a:t>
+            </a:r>
+            <a:r>
+              <a:rPr lang="de-AT" dirty="0" err="1" smtClean="0"/>
+              <a:t>Chromosonen</a:t>
+            </a:r>
+            <a:r>
+              <a:rPr lang="de-AT" dirty="0" smtClean="0"/>
+              <a:t>-Satz</a:t>
+            </a:r>
+            <a:endParaRPr lang="en-US" dirty="0"/>
+          </a:p>
+        </p:txBody>
+      </p:sp>
+      <p:sp>
+        <p:nvSpPr>
+          <p:cNvPr id="4" name="Foliennummernplatzhalter 3"/>
+          <p:cNvSpPr>
+            <a:spLocks noGrp="1"/>
+          </p:cNvSpPr>
+          <p:nvPr>
+            <p:ph type="sldNum" sz="quarter" idx="10"/>
+          </p:nvPr>
+        </p:nvSpPr>
+        <p:spPr/>
+        <p:txBody>
+          <a:bodyPr/>
+          <a:lstStyle/>
+          <a:p>
+            <a:fld id="{C857F784-7E00-4EDA-BC2E-93D39A2A3D4A}" type="slidenum">
+              <a:rPr lang="en-US" smtClean="0"/>
+              <a:t>8</a:t>
+            </a:fld>
+            <a:endParaRPr lang="en-US"/>
+          </a:p>
+        </p:txBody>
+      </p:sp>
+    </p:spTree>
+    <p:extLst>
+      <p:ext uri="{BB962C8B-B14F-4D97-AF65-F5344CB8AC3E}">
+        <p14:creationId xmlns:p14="http://schemas.microsoft.com/office/powerpoint/2010/main" val="4164641089"/>
+      </p:ext>
+    </p:extLst>
+  </p:cSld>
+  <p:clrMapOvr>
+    <a:masterClrMapping/>
+  </p:clrMapOvr>
+</p:notes>
 </file>
 
 <file path=ppt/slideLayouts/slideLayout1.xml><?xml version="1.0" encoding="utf-8"?>
@@ -249,7 +709,7 @@
           <a:p>
             <a:fld id="{61820CC9-95A3-4715-9A74-64AD27111C9E}" type="datetimeFigureOut">
               <a:rPr lang="en-US" smtClean="0"/>
-              <a:t>3/26/2016</a:t>
+              <a:t>3/27/2016</a:t>
             </a:fld>
             <a:endParaRPr lang="en-US"/>
           </a:p>
@@ -419,7 +879,7 @@
           <a:p>
             <a:fld id="{61820CC9-95A3-4715-9A74-64AD27111C9E}" type="datetimeFigureOut">
               <a:rPr lang="en-US" smtClean="0"/>
-              <a:t>3/26/2016</a:t>
+              <a:t>3/27/2016</a:t>
             </a:fld>
             <a:endParaRPr lang="en-US"/>
           </a:p>
@@ -599,7 +1059,7 @@
           <a:p>
             <a:fld id="{61820CC9-95A3-4715-9A74-64AD27111C9E}" type="datetimeFigureOut">
               <a:rPr lang="en-US" smtClean="0"/>
-              <a:t>3/26/2016</a:t>
+              <a:t>3/27/2016</a:t>
             </a:fld>
             <a:endParaRPr lang="en-US"/>
           </a:p>
@@ -769,7 +1229,7 @@
           <a:p>
             <a:fld id="{61820CC9-95A3-4715-9A74-64AD27111C9E}" type="datetimeFigureOut">
               <a:rPr lang="en-US" smtClean="0"/>
-              <a:t>3/26/2016</a:t>
+              <a:t>3/27/2016</a:t>
             </a:fld>
             <a:endParaRPr lang="en-US"/>
           </a:p>
@@ -1015,7 +1475,7 @@
           <a:p>
             <a:fld id="{61820CC9-95A3-4715-9A74-64AD27111C9E}" type="datetimeFigureOut">
               <a:rPr lang="en-US" smtClean="0"/>
-              <a:t>3/26/2016</a:t>
+              <a:t>3/27/2016</a:t>
             </a:fld>
             <a:endParaRPr lang="en-US"/>
           </a:p>
@@ -1247,7 +1707,7 @@
           <a:p>
             <a:fld id="{61820CC9-95A3-4715-9A74-64AD27111C9E}" type="datetimeFigureOut">
               <a:rPr lang="en-US" smtClean="0"/>
-              <a:t>3/26/2016</a:t>
+              <a:t>3/27/2016</a:t>
             </a:fld>
             <a:endParaRPr lang="en-US"/>
           </a:p>
@@ -1614,7 +2074,7 @@
           <a:p>
             <a:fld id="{61820CC9-95A3-4715-9A74-64AD27111C9E}" type="datetimeFigureOut">
               <a:rPr lang="en-US" smtClean="0"/>
-              <a:t>3/26/2016</a:t>
+              <a:t>3/27/2016</a:t>
             </a:fld>
             <a:endParaRPr lang="en-US"/>
           </a:p>
@@ -1732,7 +2192,7 @@
           <a:p>
             <a:fld id="{61820CC9-95A3-4715-9A74-64AD27111C9E}" type="datetimeFigureOut">
               <a:rPr lang="en-US" smtClean="0"/>
-              <a:t>3/26/2016</a:t>
+              <a:t>3/27/2016</a:t>
             </a:fld>
             <a:endParaRPr lang="en-US"/>
           </a:p>
@@ -1827,7 +2287,7 @@
           <a:p>
             <a:fld id="{61820CC9-95A3-4715-9A74-64AD27111C9E}" type="datetimeFigureOut">
               <a:rPr lang="en-US" smtClean="0"/>
-              <a:t>3/26/2016</a:t>
+              <a:t>3/27/2016</a:t>
             </a:fld>
             <a:endParaRPr lang="en-US"/>
           </a:p>
@@ -2104,7 +2564,7 @@
           <a:p>
             <a:fld id="{61820CC9-95A3-4715-9A74-64AD27111C9E}" type="datetimeFigureOut">
               <a:rPr lang="en-US" smtClean="0"/>
-              <a:t>3/26/2016</a:t>
+              <a:t>3/27/2016</a:t>
             </a:fld>
             <a:endParaRPr lang="en-US"/>
           </a:p>
@@ -2357,7 +2817,7 @@
           <a:p>
             <a:fld id="{61820CC9-95A3-4715-9A74-64AD27111C9E}" type="datetimeFigureOut">
               <a:rPr lang="en-US" smtClean="0"/>
-              <a:t>3/26/2016</a:t>
+              <a:t>3/27/2016</a:t>
             </a:fld>
             <a:endParaRPr lang="en-US"/>
           </a:p>
@@ -2570,7 +3030,7 @@
           <a:p>
             <a:fld id="{61820CC9-95A3-4715-9A74-64AD27111C9E}" type="datetimeFigureOut">
               <a:rPr lang="en-US" smtClean="0"/>
-              <a:t>3/26/2016</a:t>
+              <a:t>3/27/2016</a:t>
             </a:fld>
             <a:endParaRPr lang="en-US"/>
           </a:p>
@@ -3081,7 +3541,7 @@
           <a:p>
             <a:r>
               <a:rPr lang="de-AT" dirty="0" smtClean="0"/>
-              <a:t>Quellen</a:t>
+              <a:t>Einsatzgebiete: Krankenhäuser</a:t>
             </a:r>
             <a:endParaRPr lang="en-US" dirty="0"/>
           </a:p>
@@ -3102,14 +3562,30 @@
           <a:bodyPr/>
           <a:lstStyle/>
           <a:p>
-            <a:endParaRPr lang="en-US"/>
+            <a:r>
+              <a:rPr lang="de-AT" dirty="0" smtClean="0"/>
+              <a:t>Elektronische Krankenakten</a:t>
+            </a:r>
+          </a:p>
+          <a:p>
+            <a:r>
+              <a:rPr lang="de-AT" dirty="0" smtClean="0"/>
+              <a:t>Wartezeiten in Notaufnahmen</a:t>
+            </a:r>
+          </a:p>
+          <a:p>
+            <a:r>
+              <a:rPr lang="de-AT" dirty="0" smtClean="0"/>
+              <a:t>Probleme im Pflegeberreich</a:t>
+            </a:r>
+            <a:endParaRPr lang="en-US" dirty="0"/>
           </a:p>
         </p:txBody>
       </p:sp>
     </p:spTree>
     <p:extLst>
       <p:ext uri="{BB962C8B-B14F-4D97-AF65-F5344CB8AC3E}">
-        <p14:creationId xmlns:p14="http://schemas.microsoft.com/office/powerpoint/2010/main" val="378599850"/>
+        <p14:creationId xmlns:p14="http://schemas.microsoft.com/office/powerpoint/2010/main" val="3440817114"/>
       </p:ext>
     </p:extLst>
   </p:cSld>
@@ -3160,6 +3636,845 @@
           <a:p>
             <a:r>
               <a:rPr lang="de-AT" dirty="0" smtClean="0"/>
+              <a:t>Einsatzgebiete: </a:t>
+            </a:r>
+            <a:r>
+              <a:rPr lang="de-AT" dirty="0" err="1" smtClean="0"/>
+              <a:t>Patient_innen</a:t>
+            </a:r>
+            <a:r>
+              <a:rPr lang="de-AT" dirty="0" smtClean="0"/>
+              <a:t> </a:t>
+            </a:r>
+            <a:endParaRPr lang="en-US" dirty="0"/>
+          </a:p>
+        </p:txBody>
+      </p:sp>
+      <p:sp>
+        <p:nvSpPr>
+          <p:cNvPr id="3" name="Inhaltsplatzhalter 2"/>
+          <p:cNvSpPr>
+            <a:spLocks noGrp="1"/>
+          </p:cNvSpPr>
+          <p:nvPr>
+            <p:ph idx="1"/>
+          </p:nvPr>
+        </p:nvSpPr>
+        <p:spPr/>
+        <p:txBody>
+          <a:bodyPr>
+            <a:normAutofit/>
+          </a:bodyPr>
+          <a:lstStyle/>
+          <a:p>
+            <a:pPr lvl="1"/>
+            <a:r>
+              <a:rPr lang="de-AT" sz="2800" dirty="0" smtClean="0"/>
+              <a:t>Beispiel Diabetes:</a:t>
+            </a:r>
+          </a:p>
+          <a:p>
+            <a:pPr lvl="2"/>
+            <a:r>
+              <a:rPr lang="en-US" sz="2400" dirty="0"/>
+              <a:t>Sentry </a:t>
+            </a:r>
+            <a:r>
+              <a:rPr lang="en-US" sz="2400" dirty="0" smtClean="0"/>
+              <a:t>Armband</a:t>
+            </a:r>
+          </a:p>
+          <a:p>
+            <a:pPr lvl="2"/>
+            <a:r>
+              <a:rPr lang="en-US" sz="2400" dirty="0" err="1"/>
+              <a:t>Norvatis</a:t>
+            </a:r>
+            <a:r>
+              <a:rPr lang="en-US" sz="2400" dirty="0"/>
+              <a:t>/Google </a:t>
+            </a:r>
+            <a:r>
+              <a:rPr lang="en-US" sz="2400" dirty="0" err="1" smtClean="0"/>
+              <a:t>Kontaktlinsen</a:t>
+            </a:r>
+            <a:endParaRPr lang="en-US" sz="2400" dirty="0" smtClean="0"/>
+          </a:p>
+          <a:p>
+            <a:pPr lvl="2"/>
+            <a:r>
+              <a:rPr lang="en-US" sz="2400" dirty="0"/>
+              <a:t>Medtronic </a:t>
+            </a:r>
+            <a:r>
+              <a:rPr lang="en-US" sz="2400" dirty="0" err="1" smtClean="0"/>
+              <a:t>Insulinpumpe</a:t>
+            </a:r>
+            <a:endParaRPr lang="en-US" sz="2400" dirty="0"/>
+          </a:p>
+        </p:txBody>
+      </p:sp>
+      <p:pic>
+        <p:nvPicPr>
+          <p:cNvPr id="4" name="Grafik 3"/>
+          <p:cNvPicPr>
+            <a:picLocks noChangeAspect="1"/>
+          </p:cNvPicPr>
+          <p:nvPr/>
+        </p:nvPicPr>
+        <p:blipFill>
+          <a:blip r:embed="rId2" cstate="print">
+            <a:extLst>
+              <a:ext uri="{28A0092B-C50C-407E-A947-70E740481C1C}">
+                <a14:useLocalDpi xmlns:a14="http://schemas.microsoft.com/office/drawing/2010/main" val="0"/>
+              </a:ext>
+            </a:extLst>
+          </a:blip>
+          <a:stretch>
+            <a:fillRect/>
+          </a:stretch>
+        </p:blipFill>
+        <p:spPr>
+          <a:xfrm>
+            <a:off x="9034480" y="3277075"/>
+            <a:ext cx="2276117" cy="1448438"/>
+          </a:xfrm>
+          <a:prstGeom prst="rect">
+            <a:avLst/>
+          </a:prstGeom>
+        </p:spPr>
+      </p:pic>
+      <p:pic>
+        <p:nvPicPr>
+          <p:cNvPr id="5" name="Grafik 4"/>
+          <p:cNvPicPr>
+            <a:picLocks noChangeAspect="1"/>
+          </p:cNvPicPr>
+          <p:nvPr/>
+        </p:nvPicPr>
+        <p:blipFill>
+          <a:blip r:embed="rId3">
+            <a:extLst>
+              <a:ext uri="{28A0092B-C50C-407E-A947-70E740481C1C}">
+                <a14:useLocalDpi xmlns:a14="http://schemas.microsoft.com/office/drawing/2010/main" val="0"/>
+              </a:ext>
+            </a:extLst>
+          </a:blip>
+          <a:stretch>
+            <a:fillRect/>
+          </a:stretch>
+        </p:blipFill>
+        <p:spPr>
+          <a:xfrm>
+            <a:off x="9372091" y="277207"/>
+            <a:ext cx="1687300" cy="2387689"/>
+          </a:xfrm>
+          <a:prstGeom prst="rect">
+            <a:avLst/>
+          </a:prstGeom>
+        </p:spPr>
+      </p:pic>
+      <p:pic>
+        <p:nvPicPr>
+          <p:cNvPr id="6" name="Grafik 5"/>
+          <p:cNvPicPr>
+            <a:picLocks noChangeAspect="1"/>
+          </p:cNvPicPr>
+          <p:nvPr/>
+        </p:nvPicPr>
+        <p:blipFill>
+          <a:blip r:embed="rId4" cstate="print">
+            <a:extLst>
+              <a:ext uri="{28A0092B-C50C-407E-A947-70E740481C1C}">
+                <a14:useLocalDpi xmlns:a14="http://schemas.microsoft.com/office/drawing/2010/main" val="0"/>
+              </a:ext>
+            </a:extLst>
+          </a:blip>
+          <a:stretch>
+            <a:fillRect/>
+          </a:stretch>
+        </p:blipFill>
+        <p:spPr>
+          <a:xfrm>
+            <a:off x="8991279" y="5239012"/>
+            <a:ext cx="2362521" cy="1072888"/>
+          </a:xfrm>
+          <a:prstGeom prst="rect">
+            <a:avLst/>
+          </a:prstGeom>
+        </p:spPr>
+      </p:pic>
+    </p:spTree>
+    <p:extLst>
+      <p:ext uri="{BB962C8B-B14F-4D97-AF65-F5344CB8AC3E}">
+        <p14:creationId xmlns:p14="http://schemas.microsoft.com/office/powerpoint/2010/main" val="737591607"/>
+      </p:ext>
+    </p:extLst>
+  </p:cSld>
+  <p:clrMapOvr>
+    <a:masterClrMapping/>
+  </p:clrMapOvr>
+  <p:timing>
+    <p:tnLst>
+      <p:par>
+        <p:cTn id="1" dur="indefinite" restart="never" nodeType="tmRoot">
+          <p:childTnLst>
+            <p:seq concurrent="1" nextAc="seek">
+              <p:cTn id="2" dur="indefinite" nodeType="mainSeq">
+                <p:childTnLst>
+                  <p:par>
+                    <p:cTn id="3" fill="hold">
+                      <p:stCondLst>
+                        <p:cond delay="indefinite"/>
+                      </p:stCondLst>
+                      <p:childTnLst>
+                        <p:par>
+                          <p:cTn id="4" fill="hold">
+                            <p:stCondLst>
+                              <p:cond delay="0"/>
+                            </p:stCondLst>
+                            <p:childTnLst>
+                              <p:par>
+                                <p:cTn id="5" presetID="6" presetClass="emph" presetSubtype="0" fill="hold" nodeType="clickEffect">
+                                  <p:stCondLst>
+                                    <p:cond delay="0"/>
+                                  </p:stCondLst>
+                                  <p:childTnLst>
+                                    <p:animScale>
+                                      <p:cBhvr>
+                                        <p:cTn id="6" dur="2000" fill="hold"/>
+                                        <p:tgtEl>
+                                          <p:spTgt spid="5"/>
+                                        </p:tgtEl>
+                                      </p:cBhvr>
+                                      <p:by x="150000" y="150000"/>
+                                    </p:animScale>
+                                  </p:childTnLst>
+                                </p:cTn>
+                              </p:par>
+                            </p:childTnLst>
+                          </p:cTn>
+                        </p:par>
+                      </p:childTnLst>
+                    </p:cTn>
+                  </p:par>
+                  <p:par>
+                    <p:cTn id="7" fill="hold">
+                      <p:stCondLst>
+                        <p:cond delay="indefinite"/>
+                      </p:stCondLst>
+                      <p:childTnLst>
+                        <p:par>
+                          <p:cTn id="8" fill="hold">
+                            <p:stCondLst>
+                              <p:cond delay="0"/>
+                            </p:stCondLst>
+                            <p:childTnLst>
+                              <p:par>
+                                <p:cTn id="9" presetID="6" presetClass="emph" presetSubtype="0" fill="hold" nodeType="clickEffect">
+                                  <p:stCondLst>
+                                    <p:cond delay="0"/>
+                                  </p:stCondLst>
+                                  <p:childTnLst>
+                                    <p:animScale>
+                                      <p:cBhvr>
+                                        <p:cTn id="10" dur="2000" fill="hold"/>
+                                        <p:tgtEl>
+                                          <p:spTgt spid="5"/>
+                                        </p:tgtEl>
+                                      </p:cBhvr>
+                                      <p:by x="50000" y="50000"/>
+                                    </p:animScale>
+                                  </p:childTnLst>
+                                </p:cTn>
+                              </p:par>
+                              <p:par>
+                                <p:cTn id="11" presetID="6" presetClass="emph" presetSubtype="0" fill="hold" nodeType="withEffect">
+                                  <p:stCondLst>
+                                    <p:cond delay="0"/>
+                                  </p:stCondLst>
+                                  <p:childTnLst>
+                                    <p:animScale>
+                                      <p:cBhvr>
+                                        <p:cTn id="12" dur="2000" fill="hold"/>
+                                        <p:tgtEl>
+                                          <p:spTgt spid="4"/>
+                                        </p:tgtEl>
+                                      </p:cBhvr>
+                                      <p:by x="150000" y="150000"/>
+                                    </p:animScale>
+                                  </p:childTnLst>
+                                </p:cTn>
+                              </p:par>
+                            </p:childTnLst>
+                          </p:cTn>
+                        </p:par>
+                      </p:childTnLst>
+                    </p:cTn>
+                  </p:par>
+                  <p:par>
+                    <p:cTn id="13" fill="hold">
+                      <p:stCondLst>
+                        <p:cond delay="indefinite"/>
+                      </p:stCondLst>
+                      <p:childTnLst>
+                        <p:par>
+                          <p:cTn id="14" fill="hold">
+                            <p:stCondLst>
+                              <p:cond delay="0"/>
+                            </p:stCondLst>
+                            <p:childTnLst>
+                              <p:par>
+                                <p:cTn id="15" presetID="6" presetClass="emph" presetSubtype="0" fill="hold" nodeType="clickEffect">
+                                  <p:stCondLst>
+                                    <p:cond delay="0"/>
+                                  </p:stCondLst>
+                                  <p:childTnLst>
+                                    <p:animScale>
+                                      <p:cBhvr>
+                                        <p:cTn id="16" dur="2000" fill="hold"/>
+                                        <p:tgtEl>
+                                          <p:spTgt spid="4"/>
+                                        </p:tgtEl>
+                                      </p:cBhvr>
+                                      <p:by x="50000" y="50000"/>
+                                    </p:animScale>
+                                  </p:childTnLst>
+                                </p:cTn>
+                              </p:par>
+                              <p:par>
+                                <p:cTn id="17" presetID="6" presetClass="emph" presetSubtype="0" fill="hold" nodeType="withEffect">
+                                  <p:stCondLst>
+                                    <p:cond delay="0"/>
+                                  </p:stCondLst>
+                                  <p:childTnLst>
+                                    <p:animScale>
+                                      <p:cBhvr>
+                                        <p:cTn id="18" dur="2000" fill="hold"/>
+                                        <p:tgtEl>
+                                          <p:spTgt spid="6"/>
+                                        </p:tgtEl>
+                                      </p:cBhvr>
+                                      <p:by x="150000" y="150000"/>
+                                    </p:animScale>
+                                  </p:childTnLst>
+                                </p:cTn>
+                              </p:par>
+                            </p:childTnLst>
+                          </p:cTn>
+                        </p:par>
+                      </p:childTnLst>
+                    </p:cTn>
+                  </p:par>
+                </p:childTnLst>
+              </p:cTn>
+              <p:prevCondLst>
+                <p:cond evt="onPrev" delay="0">
+                  <p:tgtEl>
+                    <p:sldTgt/>
+                  </p:tgtEl>
+                </p:cond>
+              </p:prevCondLst>
+              <p:nextCondLst>
+                <p:cond evt="onNext" delay="0">
+                  <p:tgtEl>
+                    <p:sldTgt/>
+                  </p:tgtEl>
+                </p:cond>
+              </p:nextCondLst>
+            </p:seq>
+          </p:childTnLst>
+        </p:cTn>
+      </p:par>
+    </p:tnLst>
+  </p:timing>
+</p:sld>
+</file>
+
+<file path=ppt/slides/slide12.xml><?xml version="1.0" encoding="utf-8"?>
+<p:sld xmlns:a="http://schemas.openxmlformats.org/drawingml/2006/main" xmlns:r="http://schemas.openxmlformats.org/officeDocument/2006/relationships" xmlns:p="http://schemas.openxmlformats.org/presentationml/2006/main">
+  <p:cSld>
+    <p:spTree>
+      <p:nvGrpSpPr>
+        <p:cNvPr id="1" name=""/>
+        <p:cNvGrpSpPr/>
+        <p:nvPr/>
+      </p:nvGrpSpPr>
+      <p:grpSpPr>
+        <a:xfrm>
+          <a:off x="0" y="0"/>
+          <a:ext cx="0" cy="0"/>
+          <a:chOff x="0" y="0"/>
+          <a:chExt cx="0" cy="0"/>
+        </a:xfrm>
+      </p:grpSpPr>
+      <p:sp>
+        <p:nvSpPr>
+          <p:cNvPr id="2" name="Titel 1"/>
+          <p:cNvSpPr>
+            <a:spLocks noGrp="1"/>
+          </p:cNvSpPr>
+          <p:nvPr>
+            <p:ph type="title"/>
+          </p:nvPr>
+        </p:nvSpPr>
+        <p:spPr/>
+        <p:txBody>
+          <a:bodyPr/>
+          <a:lstStyle/>
+          <a:p>
+            <a:r>
+              <a:rPr lang="de-AT" dirty="0" smtClean="0"/>
+              <a:t>Einsatzgebiete: Pharm. Unternehmen</a:t>
+            </a:r>
+            <a:endParaRPr lang="en-US" dirty="0"/>
+          </a:p>
+        </p:txBody>
+      </p:sp>
+      <p:sp>
+        <p:nvSpPr>
+          <p:cNvPr id="3" name="Inhaltsplatzhalter 2"/>
+          <p:cNvSpPr>
+            <a:spLocks noGrp="1"/>
+          </p:cNvSpPr>
+          <p:nvPr>
+            <p:ph idx="1"/>
+          </p:nvPr>
+        </p:nvSpPr>
+        <p:spPr/>
+        <p:txBody>
+          <a:bodyPr/>
+          <a:lstStyle/>
+          <a:p>
+            <a:r>
+              <a:rPr lang="de-AT" dirty="0" smtClean="0"/>
+              <a:t>Herstellungsprozess von Medikamenten</a:t>
+            </a:r>
+          </a:p>
+          <a:p>
+            <a:pPr lvl="1"/>
+            <a:r>
+              <a:rPr lang="de-AT" dirty="0" smtClean="0"/>
+              <a:t>Kosten und zeitaufwendiges Verfahren</a:t>
+            </a:r>
+          </a:p>
+          <a:p>
+            <a:pPr lvl="1"/>
+            <a:r>
+              <a:rPr lang="de-AT" dirty="0" smtClean="0"/>
+              <a:t>auf Basis von manuellen sowie Sensor-Messdaten</a:t>
+            </a:r>
+          </a:p>
+          <a:p>
+            <a:pPr lvl="1"/>
+            <a:r>
+              <a:rPr lang="de-AT" dirty="0" smtClean="0"/>
+              <a:t>Entscheidungsgrundlage für die Fortsetzung</a:t>
+            </a:r>
+          </a:p>
+          <a:p>
+            <a:pPr lvl="1"/>
+            <a:endParaRPr lang="de-AT" dirty="0"/>
+          </a:p>
+          <a:p>
+            <a:pPr lvl="1"/>
+            <a:endParaRPr lang="de-AT" dirty="0" smtClean="0"/>
+          </a:p>
+          <a:p>
+            <a:pPr lvl="1"/>
+            <a:r>
+              <a:rPr lang="de-AT" dirty="0" smtClean="0"/>
+              <a:t>Unteranderem Einsatz von:</a:t>
+            </a:r>
+          </a:p>
+          <a:p>
+            <a:pPr lvl="2"/>
+            <a:r>
+              <a:rPr lang="de-AT" dirty="0" smtClean="0"/>
+              <a:t>Single </a:t>
+            </a:r>
+            <a:r>
+              <a:rPr lang="de-AT" dirty="0" err="1" smtClean="0"/>
+              <a:t>Cell</a:t>
+            </a:r>
+            <a:r>
+              <a:rPr lang="de-AT" dirty="0" smtClean="0"/>
+              <a:t> Measurement</a:t>
+            </a:r>
+            <a:endParaRPr lang="en-US" dirty="0"/>
+          </a:p>
+        </p:txBody>
+      </p:sp>
+    </p:spTree>
+    <p:extLst>
+      <p:ext uri="{BB962C8B-B14F-4D97-AF65-F5344CB8AC3E}">
+        <p14:creationId xmlns:p14="http://schemas.microsoft.com/office/powerpoint/2010/main" val="600530262"/>
+      </p:ext>
+    </p:extLst>
+  </p:cSld>
+  <p:clrMapOvr>
+    <a:masterClrMapping/>
+  </p:clrMapOvr>
+  <p:timing>
+    <p:tnLst>
+      <p:par>
+        <p:cTn id="1" dur="indefinite" restart="never" nodeType="tmRoot"/>
+      </p:par>
+    </p:tnLst>
+  </p:timing>
+</p:sld>
+</file>
+
+<file path=ppt/slides/slide13.xml><?xml version="1.0" encoding="utf-8"?>
+<p:sld xmlns:a="http://schemas.openxmlformats.org/drawingml/2006/main" xmlns:r="http://schemas.openxmlformats.org/officeDocument/2006/relationships" xmlns:p="http://schemas.openxmlformats.org/presentationml/2006/main">
+  <p:cSld>
+    <p:spTree>
+      <p:nvGrpSpPr>
+        <p:cNvPr id="1" name=""/>
+        <p:cNvGrpSpPr/>
+        <p:nvPr/>
+      </p:nvGrpSpPr>
+      <p:grpSpPr>
+        <a:xfrm>
+          <a:off x="0" y="0"/>
+          <a:ext cx="0" cy="0"/>
+          <a:chOff x="0" y="0"/>
+          <a:chExt cx="0" cy="0"/>
+        </a:xfrm>
+      </p:grpSpPr>
+      <p:sp>
+        <p:nvSpPr>
+          <p:cNvPr id="2" name="Titel 1"/>
+          <p:cNvSpPr>
+            <a:spLocks noGrp="1"/>
+          </p:cNvSpPr>
+          <p:nvPr>
+            <p:ph type="title"/>
+          </p:nvPr>
+        </p:nvSpPr>
+        <p:spPr/>
+        <p:txBody>
+          <a:bodyPr/>
+          <a:lstStyle/>
+          <a:p>
+            <a:r>
+              <a:rPr lang="de-AT" dirty="0" smtClean="0"/>
+              <a:t>Gene Expression</a:t>
+            </a:r>
+            <a:endParaRPr lang="en-US" dirty="0"/>
+          </a:p>
+        </p:txBody>
+      </p:sp>
+      <p:sp>
+        <p:nvSpPr>
+          <p:cNvPr id="3" name="Inhaltsplatzhalter 2"/>
+          <p:cNvSpPr>
+            <a:spLocks noGrp="1"/>
+          </p:cNvSpPr>
+          <p:nvPr>
+            <p:ph idx="1"/>
+          </p:nvPr>
+        </p:nvSpPr>
+        <p:spPr/>
+        <p:txBody>
+          <a:bodyPr/>
+          <a:lstStyle/>
+          <a:p>
+            <a:endParaRPr lang="en-US"/>
+          </a:p>
+        </p:txBody>
+      </p:sp>
+    </p:spTree>
+    <p:extLst>
+      <p:ext uri="{BB962C8B-B14F-4D97-AF65-F5344CB8AC3E}">
+        <p14:creationId xmlns:p14="http://schemas.microsoft.com/office/powerpoint/2010/main" val="2285297158"/>
+      </p:ext>
+    </p:extLst>
+  </p:cSld>
+  <p:clrMapOvr>
+    <a:masterClrMapping/>
+  </p:clrMapOvr>
+  <p:timing>
+    <p:tnLst>
+      <p:par>
+        <p:cTn id="1" dur="indefinite" restart="never" nodeType="tmRoot"/>
+      </p:par>
+    </p:tnLst>
+  </p:timing>
+</p:sld>
+</file>
+
+<file path=ppt/slides/slide14.xml><?xml version="1.0" encoding="utf-8"?>
+<p:sld xmlns:a="http://schemas.openxmlformats.org/drawingml/2006/main" xmlns:r="http://schemas.openxmlformats.org/officeDocument/2006/relationships" xmlns:p="http://schemas.openxmlformats.org/presentationml/2006/main">
+  <p:cSld>
+    <p:spTree>
+      <p:nvGrpSpPr>
+        <p:cNvPr id="1" name=""/>
+        <p:cNvGrpSpPr/>
+        <p:nvPr/>
+      </p:nvGrpSpPr>
+      <p:grpSpPr>
+        <a:xfrm>
+          <a:off x="0" y="0"/>
+          <a:ext cx="0" cy="0"/>
+          <a:chOff x="0" y="0"/>
+          <a:chExt cx="0" cy="0"/>
+        </a:xfrm>
+      </p:grpSpPr>
+      <p:sp>
+        <p:nvSpPr>
+          <p:cNvPr id="2" name="Titel 1"/>
+          <p:cNvSpPr>
+            <a:spLocks noGrp="1"/>
+          </p:cNvSpPr>
+          <p:nvPr>
+            <p:ph type="title"/>
+          </p:nvPr>
+        </p:nvSpPr>
+        <p:spPr/>
+        <p:txBody>
+          <a:bodyPr/>
+          <a:lstStyle/>
+          <a:p>
+            <a:r>
+              <a:rPr lang="de-AT" dirty="0" smtClean="0"/>
+              <a:t>Human Genome Project</a:t>
+            </a:r>
+            <a:endParaRPr lang="en-US" dirty="0"/>
+          </a:p>
+        </p:txBody>
+      </p:sp>
+      <p:sp>
+        <p:nvSpPr>
+          <p:cNvPr id="3" name="Inhaltsplatzhalter 2"/>
+          <p:cNvSpPr>
+            <a:spLocks noGrp="1"/>
+          </p:cNvSpPr>
+          <p:nvPr>
+            <p:ph idx="1"/>
+          </p:nvPr>
+        </p:nvSpPr>
+        <p:spPr/>
+        <p:txBody>
+          <a:bodyPr/>
+          <a:lstStyle/>
+          <a:p>
+            <a:endParaRPr lang="en-US"/>
+          </a:p>
+        </p:txBody>
+      </p:sp>
+    </p:spTree>
+    <p:extLst>
+      <p:ext uri="{BB962C8B-B14F-4D97-AF65-F5344CB8AC3E}">
+        <p14:creationId xmlns:p14="http://schemas.microsoft.com/office/powerpoint/2010/main" val="3298647020"/>
+      </p:ext>
+    </p:extLst>
+  </p:cSld>
+  <p:clrMapOvr>
+    <a:masterClrMapping/>
+  </p:clrMapOvr>
+  <p:timing>
+    <p:tnLst>
+      <p:par>
+        <p:cTn id="1" dur="indefinite" restart="never" nodeType="tmRoot"/>
+      </p:par>
+    </p:tnLst>
+  </p:timing>
+</p:sld>
+</file>
+
+<file path=ppt/slides/slide15.xml><?xml version="1.0" encoding="utf-8"?>
+<p:sld xmlns:a="http://schemas.openxmlformats.org/drawingml/2006/main" xmlns:r="http://schemas.openxmlformats.org/officeDocument/2006/relationships" xmlns:p="http://schemas.openxmlformats.org/presentationml/2006/main">
+  <p:cSld>
+    <p:spTree>
+      <p:nvGrpSpPr>
+        <p:cNvPr id="1" name=""/>
+        <p:cNvGrpSpPr/>
+        <p:nvPr/>
+      </p:nvGrpSpPr>
+      <p:grpSpPr>
+        <a:xfrm>
+          <a:off x="0" y="0"/>
+          <a:ext cx="0" cy="0"/>
+          <a:chOff x="0" y="0"/>
+          <a:chExt cx="0" cy="0"/>
+        </a:xfrm>
+      </p:grpSpPr>
+      <p:sp>
+        <p:nvSpPr>
+          <p:cNvPr id="2" name="Titel 1"/>
+          <p:cNvSpPr>
+            <a:spLocks noGrp="1"/>
+          </p:cNvSpPr>
+          <p:nvPr>
+            <p:ph type="title"/>
+          </p:nvPr>
+        </p:nvSpPr>
+        <p:spPr/>
+        <p:txBody>
+          <a:bodyPr/>
+          <a:lstStyle/>
+          <a:p>
+            <a:r>
+              <a:rPr lang="de-AT" dirty="0" err="1" smtClean="0"/>
+              <a:t>Folding@Home</a:t>
+            </a:r>
+            <a:endParaRPr lang="en-US" dirty="0"/>
+          </a:p>
+        </p:txBody>
+      </p:sp>
+      <p:sp>
+        <p:nvSpPr>
+          <p:cNvPr id="3" name="Inhaltsplatzhalter 2"/>
+          <p:cNvSpPr>
+            <a:spLocks noGrp="1"/>
+          </p:cNvSpPr>
+          <p:nvPr>
+            <p:ph idx="1"/>
+          </p:nvPr>
+        </p:nvSpPr>
+        <p:spPr/>
+        <p:txBody>
+          <a:bodyPr/>
+          <a:lstStyle/>
+          <a:p>
+            <a:endParaRPr lang="en-US"/>
+          </a:p>
+        </p:txBody>
+      </p:sp>
+    </p:spTree>
+    <p:extLst>
+      <p:ext uri="{BB962C8B-B14F-4D97-AF65-F5344CB8AC3E}">
+        <p14:creationId xmlns:p14="http://schemas.microsoft.com/office/powerpoint/2010/main" val="3807535514"/>
+      </p:ext>
+    </p:extLst>
+  </p:cSld>
+  <p:clrMapOvr>
+    <a:masterClrMapping/>
+  </p:clrMapOvr>
+  <p:timing>
+    <p:tnLst>
+      <p:par>
+        <p:cTn id="1" dur="indefinite" restart="never" nodeType="tmRoot"/>
+      </p:par>
+    </p:tnLst>
+  </p:timing>
+</p:sld>
+</file>
+
+<file path=ppt/slides/slide16.xml><?xml version="1.0" encoding="utf-8"?>
+<p:sld xmlns:a="http://schemas.openxmlformats.org/drawingml/2006/main" xmlns:r="http://schemas.openxmlformats.org/officeDocument/2006/relationships" xmlns:p="http://schemas.openxmlformats.org/presentationml/2006/main">
+  <p:cSld>
+    <p:spTree>
+      <p:nvGrpSpPr>
+        <p:cNvPr id="1" name=""/>
+        <p:cNvGrpSpPr/>
+        <p:nvPr/>
+      </p:nvGrpSpPr>
+      <p:grpSpPr>
+        <a:xfrm>
+          <a:off x="0" y="0"/>
+          <a:ext cx="0" cy="0"/>
+          <a:chOff x="0" y="0"/>
+          <a:chExt cx="0" cy="0"/>
+        </a:xfrm>
+      </p:grpSpPr>
+      <p:sp>
+        <p:nvSpPr>
+          <p:cNvPr id="2" name="Titel 1"/>
+          <p:cNvSpPr>
+            <a:spLocks noGrp="1"/>
+          </p:cNvSpPr>
+          <p:nvPr>
+            <p:ph type="title"/>
+          </p:nvPr>
+        </p:nvSpPr>
+        <p:spPr/>
+        <p:txBody>
+          <a:bodyPr/>
+          <a:lstStyle/>
+          <a:p>
+            <a:r>
+              <a:rPr lang="de-AT" dirty="0" smtClean="0"/>
+              <a:t>Quellen</a:t>
+            </a:r>
+            <a:endParaRPr lang="en-US" dirty="0"/>
+          </a:p>
+        </p:txBody>
+      </p:sp>
+      <p:sp>
+        <p:nvSpPr>
+          <p:cNvPr id="3" name="Inhaltsplatzhalter 2"/>
+          <p:cNvSpPr>
+            <a:spLocks noGrp="1"/>
+          </p:cNvSpPr>
+          <p:nvPr>
+            <p:ph idx="1"/>
+          </p:nvPr>
+        </p:nvSpPr>
+        <p:spPr/>
+        <p:txBody>
+          <a:bodyPr/>
+          <a:lstStyle/>
+          <a:p>
+            <a:endParaRPr lang="en-US"/>
+          </a:p>
+        </p:txBody>
+      </p:sp>
+    </p:spTree>
+    <p:extLst>
+      <p:ext uri="{BB962C8B-B14F-4D97-AF65-F5344CB8AC3E}">
+        <p14:creationId xmlns:p14="http://schemas.microsoft.com/office/powerpoint/2010/main" val="378599850"/>
+      </p:ext>
+    </p:extLst>
+  </p:cSld>
+  <p:clrMapOvr>
+    <a:masterClrMapping/>
+  </p:clrMapOvr>
+  <p:timing>
+    <p:tnLst>
+      <p:par>
+        <p:cTn id="1" dur="indefinite" restart="never" nodeType="tmRoot"/>
+      </p:par>
+    </p:tnLst>
+  </p:timing>
+</p:sld>
+</file>
+
+<file path=ppt/slides/slide17.xml><?xml version="1.0" encoding="utf-8"?>
+<p:sld xmlns:a="http://schemas.openxmlformats.org/drawingml/2006/main" xmlns:r="http://schemas.openxmlformats.org/officeDocument/2006/relationships" xmlns:p="http://schemas.openxmlformats.org/presentationml/2006/main">
+  <p:cSld>
+    <p:spTree>
+      <p:nvGrpSpPr>
+        <p:cNvPr id="1" name=""/>
+        <p:cNvGrpSpPr/>
+        <p:nvPr/>
+      </p:nvGrpSpPr>
+      <p:grpSpPr>
+        <a:xfrm>
+          <a:off x="0" y="0"/>
+          <a:ext cx="0" cy="0"/>
+          <a:chOff x="0" y="0"/>
+          <a:chExt cx="0" cy="0"/>
+        </a:xfrm>
+      </p:grpSpPr>
+      <p:sp>
+        <p:nvSpPr>
+          <p:cNvPr id="2" name="Titel 1"/>
+          <p:cNvSpPr>
+            <a:spLocks noGrp="1"/>
+          </p:cNvSpPr>
+          <p:nvPr>
+            <p:ph type="title"/>
+          </p:nvPr>
+        </p:nvSpPr>
+        <p:spPr/>
+        <p:txBody>
+          <a:bodyPr/>
+          <a:lstStyle/>
+          <a:p>
+            <a:r>
+              <a:rPr lang="de-AT" dirty="0" smtClean="0"/>
               <a:t>Anhang</a:t>
             </a:r>
             <a:endParaRPr lang="en-US" dirty="0"/>
@@ -3205,7 +4520,7 @@
 </p:sld>
 </file>
 
-<file path=ppt/slides/slide12.xml><?xml version="1.0" encoding="utf-8"?>
+<file path=ppt/slides/slide18.xml><?xml version="1.0" encoding="utf-8"?>
 <p:sld xmlns:a="http://schemas.openxmlformats.org/drawingml/2006/main" xmlns:r="http://schemas.openxmlformats.org/officeDocument/2006/relationships" xmlns:p="http://schemas.openxmlformats.org/presentationml/2006/main">
   <p:cSld>
     <p:spTree>
@@ -3358,8 +4673,8 @@
         </p:blipFill>
         <p:spPr>
           <a:xfrm>
-            <a:off x="1564929" y="509308"/>
-            <a:ext cx="9062137" cy="6796603"/>
+            <a:off x="-36416" y="-207192"/>
+            <a:ext cx="11538329" cy="8653747"/>
           </a:xfrm>
         </p:spPr>
       </p:pic>
@@ -3385,8 +4700,8 @@
         </p:blipFill>
         <p:spPr>
           <a:xfrm>
-            <a:off x="3508751" y="2860117"/>
-            <a:ext cx="4877935" cy="2317019"/>
+            <a:off x="2627343" y="2792610"/>
+            <a:ext cx="6210811" cy="2950135"/>
           </a:xfrm>
           <a:prstGeom prst="rect">
             <a:avLst/>
@@ -3414,8 +4729,8 @@
         </p:blipFill>
         <p:spPr>
           <a:xfrm rot="21261748">
-            <a:off x="5029200" y="2790283"/>
-            <a:ext cx="1837038" cy="2456688"/>
+            <a:off x="4563246" y="2703692"/>
+            <a:ext cx="2339001" cy="3127968"/>
           </a:xfrm>
           <a:prstGeom prst="rect">
             <a:avLst/>
@@ -3888,7 +5203,7 @@
       </p:grpSpPr>
       <p:sp>
         <p:nvSpPr>
-          <p:cNvPr id="2" name="Titel 1"/>
+          <p:cNvPr id="4" name="Titel 3"/>
           <p:cNvSpPr>
             <a:spLocks noGrp="1"/>
           </p:cNvSpPr>
@@ -3903,7 +5218,7 @@
           <a:p>
             <a:r>
               <a:rPr lang="de-AT" dirty="0" smtClean="0"/>
-              <a:t>Gene Expression</a:t>
+              <a:t>Basics I - DNA</a:t>
             </a:r>
             <a:endParaRPr lang="en-US" dirty="0"/>
           </a:p>
@@ -3911,12 +5226,12 @@
       </p:sp>
       <p:sp>
         <p:nvSpPr>
-          <p:cNvPr id="3" name="Inhaltsplatzhalter 2"/>
-          <p:cNvSpPr>
-            <a:spLocks noGrp="1"/>
-          </p:cNvSpPr>
-          <p:nvPr>
-            <p:ph idx="1"/>
+          <p:cNvPr id="5" name="Textplatzhalter 4"/>
+          <p:cNvSpPr>
+            <a:spLocks noGrp="1"/>
+          </p:cNvSpPr>
+          <p:nvPr>
+            <p:ph type="body" idx="1"/>
           </p:nvPr>
         </p:nvSpPr>
         <p:spPr/>
@@ -3931,7 +5246,7 @@
     </p:spTree>
     <p:extLst>
       <p:ext uri="{BB962C8B-B14F-4D97-AF65-F5344CB8AC3E}">
-        <p14:creationId xmlns:p14="http://schemas.microsoft.com/office/powerpoint/2010/main" val="2285297158"/>
+        <p14:creationId xmlns:p14="http://schemas.microsoft.com/office/powerpoint/2010/main" val="3577011663"/>
       </p:ext>
     </p:extLst>
   </p:cSld>
@@ -3965,67 +5280,166 @@
           <a:chExt cx="0" cy="0"/>
         </a:xfrm>
       </p:grpSpPr>
-      <p:sp>
-        <p:nvSpPr>
-          <p:cNvPr id="2" name="Titel 1"/>
-          <p:cNvSpPr>
-            <a:spLocks noGrp="1"/>
-          </p:cNvSpPr>
-          <p:nvPr>
-            <p:ph type="title"/>
-          </p:nvPr>
-        </p:nvSpPr>
-        <p:spPr/>
-        <p:txBody>
-          <a:bodyPr/>
-          <a:lstStyle/>
-          <a:p>
-            <a:r>
-              <a:rPr lang="en-US" dirty="0" smtClean="0"/>
-              <a:t>Operationalized Predictive Models (OPM)</a:t>
-            </a:r>
-            <a:endParaRPr lang="en-US" dirty="0"/>
-          </a:p>
-        </p:txBody>
-      </p:sp>
-      <p:sp>
-        <p:nvSpPr>
-          <p:cNvPr id="3" name="Inhaltsplatzhalter 2"/>
-          <p:cNvSpPr>
-            <a:spLocks noGrp="1"/>
-          </p:cNvSpPr>
-          <p:nvPr>
-            <p:ph idx="1"/>
-          </p:nvPr>
-        </p:nvSpPr>
-        <p:spPr/>
-        <p:txBody>
-          <a:bodyPr/>
-          <a:lstStyle/>
-          <a:p>
-            <a:r>
-              <a:rPr lang="de-DE" dirty="0" smtClean="0"/>
-              <a:t>Vorbeugung von unerwünschten Ereignissen </a:t>
-            </a:r>
-          </a:p>
-          <a:p>
-            <a:r>
-              <a:rPr lang="de-DE" dirty="0" smtClean="0"/>
-              <a:t>Optimierung von Abläufen </a:t>
-            </a:r>
-          </a:p>
-          <a:p>
-            <a:r>
-              <a:rPr lang="de-DE" dirty="0" smtClean="0"/>
-              <a:t>Reduktion von Kosten </a:t>
-            </a:r>
-          </a:p>
-        </p:txBody>
-      </p:sp>
+      <p:pic>
+        <p:nvPicPr>
+          <p:cNvPr id="2" name="Grafik 1"/>
+          <p:cNvPicPr>
+            <a:picLocks noChangeAspect="1"/>
+          </p:cNvPicPr>
+          <p:nvPr/>
+        </p:nvPicPr>
+        <p:blipFill>
+          <a:blip r:embed="rId2">
+            <a:extLst>
+              <a:ext uri="{28A0092B-C50C-407E-A947-70E740481C1C}">
+                <a14:useLocalDpi xmlns:a14="http://schemas.microsoft.com/office/drawing/2010/main" val="0"/>
+              </a:ext>
+            </a:extLst>
+          </a:blip>
+          <a:stretch>
+            <a:fillRect/>
+          </a:stretch>
+        </p:blipFill>
+        <p:spPr>
+          <a:xfrm>
+            <a:off x="358219" y="367645"/>
+            <a:ext cx="11189616" cy="5921049"/>
+          </a:xfrm>
+          <a:prstGeom prst="rect">
+            <a:avLst/>
+          </a:prstGeom>
+        </p:spPr>
+      </p:pic>
+      <p:sp>
+        <p:nvSpPr>
+          <p:cNvPr id="3" name="Ellipse 2"/>
+          <p:cNvSpPr/>
+          <p:nvPr/>
+        </p:nvSpPr>
+        <p:spPr>
+          <a:xfrm>
+            <a:off x="75414" y="4656841"/>
+            <a:ext cx="2988297" cy="1970201"/>
+          </a:xfrm>
+          <a:prstGeom prst="ellipse">
+            <a:avLst/>
+          </a:prstGeom>
+          <a:noFill/>
+          <a:ln w="57150">
+            <a:solidFill>
+              <a:srgbClr val="FF0000"/>
+            </a:solidFill>
+          </a:ln>
+        </p:spPr>
+        <p:style>
+          <a:lnRef idx="2">
+            <a:schemeClr val="accent1">
+              <a:shade val="50000"/>
+            </a:schemeClr>
+          </a:lnRef>
+          <a:fillRef idx="1">
+            <a:schemeClr val="accent1"/>
+          </a:fillRef>
+          <a:effectRef idx="0">
+            <a:schemeClr val="accent1"/>
+          </a:effectRef>
+          <a:fontRef idx="minor">
+            <a:schemeClr val="lt1"/>
+          </a:fontRef>
+        </p:style>
+        <p:txBody>
+          <a:bodyPr rtlCol="0" anchor="ctr"/>
+          <a:lstStyle/>
+          <a:p>
+            <a:pPr algn="ctr"/>
+            <a:endParaRPr lang="en-US"/>
+          </a:p>
+        </p:txBody>
+      </p:sp>
+      <p:sp>
+        <p:nvSpPr>
+          <p:cNvPr id="4" name="Textfeld 3"/>
+          <p:cNvSpPr txBox="1"/>
+          <p:nvPr/>
+        </p:nvSpPr>
+        <p:spPr>
+          <a:xfrm>
+            <a:off x="650450" y="952106"/>
+            <a:ext cx="5957739" cy="1200329"/>
+          </a:xfrm>
+          <a:prstGeom prst="rect">
+            <a:avLst/>
+          </a:prstGeom>
+          <a:solidFill>
+            <a:schemeClr val="accent3">
+              <a:lumMod val="60000"/>
+              <a:lumOff val="40000"/>
+            </a:schemeClr>
+          </a:solidFill>
+          <a:ln w="19050">
+            <a:noFill/>
+          </a:ln>
+        </p:spPr>
+        <p:txBody>
+          <a:bodyPr wrap="square" rtlCol="0">
+            <a:spAutoFit/>
+          </a:bodyPr>
+          <a:lstStyle/>
+          <a:p>
+            <a:r>
+              <a:rPr lang="de-AT" sz="3600" dirty="0" smtClean="0"/>
+              <a:t>Alle Gene bilden das Genom</a:t>
+            </a:r>
+          </a:p>
+          <a:p>
+            <a:r>
+              <a:rPr lang="de-AT" sz="3600" dirty="0" smtClean="0"/>
+              <a:t>Genom = Chromosomen-Satz</a:t>
+            </a:r>
+            <a:endParaRPr lang="en-US" sz="3600" dirty="0"/>
+          </a:p>
+        </p:txBody>
+      </p:sp>
+      <p:cxnSp>
+        <p:nvCxnSpPr>
+          <p:cNvPr id="6" name="Gerade Verbindung mit Pfeil 5"/>
+          <p:cNvCxnSpPr/>
+          <p:nvPr/>
+        </p:nvCxnSpPr>
+        <p:spPr>
+          <a:xfrm flipV="1">
+            <a:off x="2121031" y="2328421"/>
+            <a:ext cx="1319753" cy="2111604"/>
+          </a:xfrm>
+          <a:prstGeom prst="straightConnector1">
+            <a:avLst/>
+          </a:prstGeom>
+          <a:ln w="57150">
+            <a:solidFill>
+              <a:srgbClr val="FF0000"/>
+            </a:solidFill>
+            <a:tailEnd type="triangle"/>
+          </a:ln>
+        </p:spPr>
+        <p:style>
+          <a:lnRef idx="1">
+            <a:schemeClr val="accent2"/>
+          </a:lnRef>
+          <a:fillRef idx="0">
+            <a:schemeClr val="accent2"/>
+          </a:fillRef>
+          <a:effectRef idx="0">
+            <a:schemeClr val="accent2"/>
+          </a:effectRef>
+          <a:fontRef idx="minor">
+            <a:schemeClr val="tx1"/>
+          </a:fontRef>
+        </p:style>
+      </p:cxnSp>
     </p:spTree>
     <p:extLst>
       <p:ext uri="{BB962C8B-B14F-4D97-AF65-F5344CB8AC3E}">
-        <p14:creationId xmlns:p14="http://schemas.microsoft.com/office/powerpoint/2010/main" val="324151544"/>
+        <p14:creationId xmlns:p14="http://schemas.microsoft.com/office/powerpoint/2010/main" val="2158701736"/>
       </p:ext>
     </p:extLst>
   </p:cSld>
@@ -4035,9 +5449,153 @@
   <p:timing>
     <p:tnLst>
       <p:par>
-        <p:cTn id="1" dur="indefinite" restart="never" nodeType="tmRoot"/>
+        <p:cTn id="1" dur="indefinite" restart="never" nodeType="tmRoot">
+          <p:childTnLst>
+            <p:seq concurrent="1" nextAc="seek">
+              <p:cTn id="2" dur="indefinite" nodeType="mainSeq">
+                <p:childTnLst>
+                  <p:par>
+                    <p:cTn id="3" fill="hold">
+                      <p:stCondLst>
+                        <p:cond delay="indefinite"/>
+                      </p:stCondLst>
+                      <p:childTnLst>
+                        <p:par>
+                          <p:cTn id="4" fill="hold">
+                            <p:stCondLst>
+                              <p:cond delay="0"/>
+                            </p:stCondLst>
+                            <p:childTnLst>
+                              <p:par>
+                                <p:cTn id="5" presetID="1" presetClass="entr" presetSubtype="0" fill="hold" grpId="0" nodeType="clickEffect">
+                                  <p:stCondLst>
+                                    <p:cond delay="0"/>
+                                  </p:stCondLst>
+                                  <p:childTnLst>
+                                    <p:set>
+                                      <p:cBhvr>
+                                        <p:cTn id="6" dur="1" fill="hold">
+                                          <p:stCondLst>
+                                            <p:cond delay="0"/>
+                                          </p:stCondLst>
+                                        </p:cTn>
+                                        <p:tgtEl>
+                                          <p:spTgt spid="3"/>
+                                        </p:tgtEl>
+                                        <p:attrNameLst>
+                                          <p:attrName>style.visibility</p:attrName>
+                                        </p:attrNameLst>
+                                      </p:cBhvr>
+                                      <p:to>
+                                        <p:strVal val="visible"/>
+                                      </p:to>
+                                    </p:set>
+                                  </p:childTnLst>
+                                </p:cTn>
+                              </p:par>
+                            </p:childTnLst>
+                          </p:cTn>
+                        </p:par>
+                      </p:childTnLst>
+                    </p:cTn>
+                  </p:par>
+                  <p:par>
+                    <p:cTn id="7" fill="hold">
+                      <p:stCondLst>
+                        <p:cond delay="indefinite"/>
+                      </p:stCondLst>
+                      <p:childTnLst>
+                        <p:par>
+                          <p:cTn id="8" fill="hold">
+                            <p:stCondLst>
+                              <p:cond delay="0"/>
+                            </p:stCondLst>
+                            <p:childTnLst>
+                              <p:par>
+                                <p:cTn id="9" presetID="1" presetClass="entr" presetSubtype="0" fill="hold" nodeType="clickEffect">
+                                  <p:stCondLst>
+                                    <p:cond delay="0"/>
+                                  </p:stCondLst>
+                                  <p:childTnLst>
+                                    <p:set>
+                                      <p:cBhvr>
+                                        <p:cTn id="10" dur="1" fill="hold">
+                                          <p:stCondLst>
+                                            <p:cond delay="0"/>
+                                          </p:stCondLst>
+                                        </p:cTn>
+                                        <p:tgtEl>
+                                          <p:spTgt spid="6"/>
+                                        </p:tgtEl>
+                                        <p:attrNameLst>
+                                          <p:attrName>style.visibility</p:attrName>
+                                        </p:attrNameLst>
+                                      </p:cBhvr>
+                                      <p:to>
+                                        <p:strVal val="visible"/>
+                                      </p:to>
+                                    </p:set>
+                                  </p:childTnLst>
+                                </p:cTn>
+                              </p:par>
+                              <p:par>
+                                <p:cTn id="11" presetID="1" presetClass="entr" presetSubtype="0" fill="hold" grpId="0" nodeType="withEffect">
+                                  <p:stCondLst>
+                                    <p:cond delay="0"/>
+                                  </p:stCondLst>
+                                  <p:childTnLst>
+                                    <p:set>
+                                      <p:cBhvr>
+                                        <p:cTn id="12" dur="1" fill="hold">
+                                          <p:stCondLst>
+                                            <p:cond delay="0"/>
+                                          </p:stCondLst>
+                                        </p:cTn>
+                                        <p:tgtEl>
+                                          <p:spTgt spid="4"/>
+                                        </p:tgtEl>
+                                        <p:attrNameLst>
+                                          <p:attrName>style.visibility</p:attrName>
+                                        </p:attrNameLst>
+                                      </p:cBhvr>
+                                      <p:to>
+                                        <p:strVal val="visible"/>
+                                      </p:to>
+                                    </p:set>
+                                  </p:childTnLst>
+                                </p:cTn>
+                              </p:par>
+                            </p:childTnLst>
+                          </p:cTn>
+                        </p:par>
+                      </p:childTnLst>
+                    </p:cTn>
+                  </p:par>
+                </p:childTnLst>
+              </p:cTn>
+              <p:prevCondLst>
+                <p:cond evt="onPrev" delay="0">
+                  <p:tgtEl>
+                    <p:sldTgt/>
+                  </p:tgtEl>
+                </p:cond>
+              </p:prevCondLst>
+              <p:nextCondLst>
+                <p:cond evt="onNext" delay="0">
+                  <p:tgtEl>
+                    <p:sldTgt/>
+                  </p:tgtEl>
+                </p:cond>
+              </p:nextCondLst>
+            </p:seq>
+          </p:childTnLst>
+        </p:cTn>
       </p:par>
     </p:tnLst>
+    <p:bldLst>
+      <p:bldP spid="3" grpId="0" animBg="1"/>
+      <p:bldP spid="4" grpId="0" animBg="1"/>
+    </p:bldLst>
   </p:timing>
 </p:sld>
 </file>
@@ -4059,9 +5617,68 @@
           <a:chExt cx="0" cy="0"/>
         </a:xfrm>
       </p:grpSpPr>
-      <p:sp>
-        <p:nvSpPr>
-          <p:cNvPr id="2" name="Titel 1"/>
+      <p:pic>
+        <p:nvPicPr>
+          <p:cNvPr id="2" name="Grafik 1"/>
+          <p:cNvPicPr>
+            <a:picLocks noChangeAspect="1"/>
+          </p:cNvPicPr>
+          <p:nvPr/>
+        </p:nvPicPr>
+        <p:blipFill rotWithShape="1">
+          <a:blip r:embed="rId3">
+            <a:extLst>
+              <a:ext uri="{28A0092B-C50C-407E-A947-70E740481C1C}">
+                <a14:useLocalDpi xmlns:a14="http://schemas.microsoft.com/office/drawing/2010/main" val="0"/>
+              </a:ext>
+            </a:extLst>
+          </a:blip>
+          <a:srcRect r="862" b="618"/>
+          <a:stretch/>
+        </p:blipFill>
+        <p:spPr>
+          <a:xfrm>
+            <a:off x="838200" y="1690689"/>
+            <a:ext cx="6736174" cy="4826523"/>
+          </a:xfrm>
+          <a:prstGeom prst="rect">
+            <a:avLst/>
+          </a:prstGeom>
+        </p:spPr>
+      </p:pic>
+      <p:pic>
+        <p:nvPicPr>
+          <p:cNvPr id="3" name="Grafik 2"/>
+          <p:cNvPicPr>
+            <a:picLocks noChangeAspect="1"/>
+          </p:cNvPicPr>
+          <p:nvPr/>
+        </p:nvPicPr>
+        <p:blipFill>
+          <a:blip r:embed="rId4" cstate="print">
+            <a:extLst>
+              <a:ext uri="{28A0092B-C50C-407E-A947-70E740481C1C}">
+                <a14:useLocalDpi xmlns:a14="http://schemas.microsoft.com/office/drawing/2010/main" val="0"/>
+              </a:ext>
+            </a:extLst>
+          </a:blip>
+          <a:stretch>
+            <a:fillRect/>
+          </a:stretch>
+        </p:blipFill>
+        <p:spPr>
+          <a:xfrm>
+            <a:off x="4777067" y="754144"/>
+            <a:ext cx="7414933" cy="6073183"/>
+          </a:xfrm>
+          <a:prstGeom prst="rect">
+            <a:avLst/>
+          </a:prstGeom>
+        </p:spPr>
+      </p:pic>
+      <p:sp>
+        <p:nvSpPr>
+          <p:cNvPr id="4" name="Titel 3"/>
           <p:cNvSpPr>
             <a:spLocks noGrp="1"/>
           </p:cNvSpPr>
@@ -4076,35 +5693,45 @@
           <a:p>
             <a:r>
               <a:rPr lang="de-AT" dirty="0" smtClean="0"/>
-              <a:t>Human Genome Project</a:t>
+              <a:t>Chromosomen-Satz</a:t>
             </a:r>
             <a:endParaRPr lang="en-US" dirty="0"/>
           </a:p>
         </p:txBody>
       </p:sp>
-      <p:sp>
-        <p:nvSpPr>
-          <p:cNvPr id="3" name="Inhaltsplatzhalter 2"/>
-          <p:cNvSpPr>
-            <a:spLocks noGrp="1"/>
-          </p:cNvSpPr>
-          <p:nvPr>
-            <p:ph idx="1"/>
-          </p:nvPr>
-        </p:nvSpPr>
-        <p:spPr/>
-        <p:txBody>
-          <a:bodyPr/>
-          <a:lstStyle/>
-          <a:p>
-            <a:endParaRPr lang="en-US"/>
-          </a:p>
-        </p:txBody>
-      </p:sp>
+      <p:pic>
+        <p:nvPicPr>
+          <p:cNvPr id="5" name="Grafik 4"/>
+          <p:cNvPicPr>
+            <a:picLocks noChangeAspect="1"/>
+          </p:cNvPicPr>
+          <p:nvPr/>
+        </p:nvPicPr>
+        <p:blipFill rotWithShape="1">
+          <a:blip r:embed="rId3">
+            <a:extLst>
+              <a:ext uri="{28A0092B-C50C-407E-A947-70E740481C1C}">
+                <a14:useLocalDpi xmlns:a14="http://schemas.microsoft.com/office/drawing/2010/main" val="0"/>
+              </a:ext>
+            </a:extLst>
+          </a:blip>
+          <a:srcRect l="-1" r="85070" b="65711"/>
+          <a:stretch/>
+        </p:blipFill>
+        <p:spPr>
+          <a:xfrm>
+            <a:off x="838200" y="1690688"/>
+            <a:ext cx="1014528" cy="1665255"/>
+          </a:xfrm>
+          <a:prstGeom prst="rect">
+            <a:avLst/>
+          </a:prstGeom>
+        </p:spPr>
+      </p:pic>
     </p:spTree>
     <p:extLst>
       <p:ext uri="{BB962C8B-B14F-4D97-AF65-F5344CB8AC3E}">
-        <p14:creationId xmlns:p14="http://schemas.microsoft.com/office/powerpoint/2010/main" val="3298647020"/>
+        <p14:creationId xmlns:p14="http://schemas.microsoft.com/office/powerpoint/2010/main" val="1228821062"/>
       </p:ext>
     </p:extLst>
   </p:cSld>
@@ -4114,7 +5741,106 @@
   <p:timing>
     <p:tnLst>
       <p:par>
-        <p:cTn id="1" dur="indefinite" restart="never" nodeType="tmRoot"/>
+        <p:cTn id="1" dur="indefinite" restart="never" nodeType="tmRoot">
+          <p:childTnLst>
+            <p:seq concurrent="1" nextAc="seek">
+              <p:cTn id="2" dur="indefinite" nodeType="mainSeq">
+                <p:childTnLst>
+                  <p:par>
+                    <p:cTn id="3" fill="hold">
+                      <p:stCondLst>
+                        <p:cond delay="indefinite"/>
+                      </p:stCondLst>
+                      <p:childTnLst>
+                        <p:par>
+                          <p:cTn id="4" fill="hold">
+                            <p:stCondLst>
+                              <p:cond delay="0"/>
+                            </p:stCondLst>
+                            <p:childTnLst>
+                              <p:par>
+                                <p:cTn id="5" presetID="9" presetClass="emph" presetSubtype="0" nodeType="clickEffect">
+                                  <p:stCondLst>
+                                    <p:cond delay="0"/>
+                                  </p:stCondLst>
+                                  <p:childTnLst>
+                                    <p:set>
+                                      <p:cBhvr rctx="PPT">
+                                        <p:cTn id="6" dur="indefinite"/>
+                                        <p:tgtEl>
+                                          <p:spTgt spid="2"/>
+                                        </p:tgtEl>
+                                        <p:attrNameLst>
+                                          <p:attrName>style.opacity</p:attrName>
+                                        </p:attrNameLst>
+                                      </p:cBhvr>
+                                      <p:to>
+                                        <p:strVal val="0.25"/>
+                                      </p:to>
+                                    </p:set>
+                                    <p:animEffect filter="image" prLst="opacity: 0.25">
+                                      <p:cBhvr rctx="IE">
+                                        <p:cTn id="7" dur="indefinite"/>
+                                        <p:tgtEl>
+                                          <p:spTgt spid="2"/>
+                                        </p:tgtEl>
+                                      </p:cBhvr>
+                                    </p:animEffect>
+                                  </p:childTnLst>
+                                </p:cTn>
+                              </p:par>
+                              <p:par>
+                                <p:cTn id="8" presetID="1" presetClass="entr" presetSubtype="0" fill="hold" nodeType="withEffect">
+                                  <p:stCondLst>
+                                    <p:cond delay="0"/>
+                                  </p:stCondLst>
+                                  <p:childTnLst>
+                                    <p:set>
+                                      <p:cBhvr>
+                                        <p:cTn id="9" dur="1" fill="hold">
+                                          <p:stCondLst>
+                                            <p:cond delay="0"/>
+                                          </p:stCondLst>
+                                        </p:cTn>
+                                        <p:tgtEl>
+                                          <p:spTgt spid="3"/>
+                                        </p:tgtEl>
+                                        <p:attrNameLst>
+                                          <p:attrName>style.visibility</p:attrName>
+                                        </p:attrNameLst>
+                                      </p:cBhvr>
+                                      <p:to>
+                                        <p:strVal val="visible"/>
+                                      </p:to>
+                                    </p:set>
+                                  </p:childTnLst>
+                                </p:cTn>
+                              </p:par>
+                            </p:childTnLst>
+                          </p:cTn>
+                        </p:par>
+                      </p:childTnLst>
+                    </p:cTn>
+                  </p:par>
+                </p:childTnLst>
+              </p:cTn>
+              <p:prevCondLst>
+                <p:cond evt="onPrev" delay="0">
+                  <p:tgtEl>
+                    <p:sldTgt/>
+                  </p:tgtEl>
+                </p:cond>
+              </p:prevCondLst>
+              <p:nextCondLst>
+                <p:cond evt="onNext" delay="0">
+                  <p:tgtEl>
+                    <p:sldTgt/>
+                  </p:tgtEl>
+                </p:cond>
+              </p:nextCondLst>
+            </p:seq>
+          </p:childTnLst>
+        </p:cTn>
       </p:par>
     </p:tnLst>
   </p:timing>
@@ -4138,6 +5864,92 @@
           <a:chExt cx="0" cy="0"/>
         </a:xfrm>
       </p:grpSpPr>
+      <p:pic>
+        <p:nvPicPr>
+          <p:cNvPr id="4" name="Grafik 3"/>
+          <p:cNvPicPr>
+            <a:picLocks noChangeAspect="1"/>
+          </p:cNvPicPr>
+          <p:nvPr/>
+        </p:nvPicPr>
+        <p:blipFill>
+          <a:blip r:embed="rId2">
+            <a:extLst>
+              <a:ext uri="{28A0092B-C50C-407E-A947-70E740481C1C}">
+                <a14:useLocalDpi xmlns:a14="http://schemas.microsoft.com/office/drawing/2010/main" val="0"/>
+              </a:ext>
+            </a:extLst>
+          </a:blip>
+          <a:stretch>
+            <a:fillRect/>
+          </a:stretch>
+        </p:blipFill>
+        <p:spPr>
+          <a:xfrm>
+            <a:off x="4180945" y="2718739"/>
+            <a:ext cx="6913775" cy="3593161"/>
+          </a:xfrm>
+          <a:prstGeom prst="rect">
+            <a:avLst/>
+          </a:prstGeom>
+        </p:spPr>
+      </p:pic>
+      <p:sp>
+        <p:nvSpPr>
+          <p:cNvPr id="3" name="Inhaltsplatzhalter 2"/>
+          <p:cNvSpPr>
+            <a:spLocks noGrp="1"/>
+          </p:cNvSpPr>
+          <p:nvPr>
+            <p:ph idx="1"/>
+          </p:nvPr>
+        </p:nvSpPr>
+        <p:spPr/>
+        <p:txBody>
+          <a:bodyPr/>
+          <a:lstStyle/>
+          <a:p>
+            <a:r>
+              <a:rPr lang="de-DE" dirty="0" smtClean="0"/>
+              <a:t>Bio./Medizinische </a:t>
+            </a:r>
+            <a:r>
+              <a:rPr lang="de-DE" dirty="0" smtClean="0"/>
+              <a:t>Werte zu Modellen </a:t>
+            </a:r>
+            <a:r>
+              <a:rPr lang="de-DE" dirty="0"/>
+              <a:t>zusammenführen</a:t>
+            </a:r>
+            <a:endParaRPr lang="de-DE" dirty="0" smtClean="0"/>
+          </a:p>
+          <a:p>
+            <a:pPr lvl="1"/>
+            <a:r>
+              <a:rPr lang="de-DE" dirty="0" smtClean="0"/>
+              <a:t>Vorbeugung </a:t>
+            </a:r>
+            <a:r>
+              <a:rPr lang="de-DE" dirty="0" smtClean="0"/>
+              <a:t>von unerwünschten Ereignissen </a:t>
+            </a:r>
+          </a:p>
+          <a:p>
+            <a:pPr lvl="1"/>
+            <a:r>
+              <a:rPr lang="de-DE" dirty="0" smtClean="0"/>
+              <a:t>Optimierung von Abläufen </a:t>
+            </a:r>
+          </a:p>
+          <a:p>
+            <a:pPr lvl="1"/>
+            <a:r>
+              <a:rPr lang="de-DE" dirty="0" smtClean="0"/>
+              <a:t>Reduktion von Kosten </a:t>
+            </a:r>
+          </a:p>
+        </p:txBody>
+      </p:sp>
       <p:sp>
         <p:nvSpPr>
           <p:cNvPr id="2" name="Titel 1"/>
@@ -4154,36 +5966,17 @@
           <a:lstStyle/>
           <a:p>
             <a:r>
-              <a:rPr lang="de-AT" dirty="0" err="1" smtClean="0"/>
-              <a:t>Folding@Home</a:t>
+              <a:rPr lang="en-US" dirty="0" smtClean="0"/>
+              <a:t>Operationalized Predictive Models (OPM)</a:t>
             </a:r>
             <a:endParaRPr lang="en-US" dirty="0"/>
-          </a:p>
-        </p:txBody>
-      </p:sp>
-      <p:sp>
-        <p:nvSpPr>
-          <p:cNvPr id="3" name="Inhaltsplatzhalter 2"/>
-          <p:cNvSpPr>
-            <a:spLocks noGrp="1"/>
-          </p:cNvSpPr>
-          <p:nvPr>
-            <p:ph idx="1"/>
-          </p:nvPr>
-        </p:nvSpPr>
-        <p:spPr/>
-        <p:txBody>
-          <a:bodyPr/>
-          <a:lstStyle/>
-          <a:p>
-            <a:endParaRPr lang="en-US"/>
           </a:p>
         </p:txBody>
       </p:sp>
     </p:spTree>
     <p:extLst>
       <p:ext uri="{BB962C8B-B14F-4D97-AF65-F5344CB8AC3E}">
-        <p14:creationId xmlns:p14="http://schemas.microsoft.com/office/powerpoint/2010/main" val="3807535514"/>
+        <p14:creationId xmlns:p14="http://schemas.microsoft.com/office/powerpoint/2010/main" val="324151544"/>
       </p:ext>
     </p:extLst>
   </p:cSld>
@@ -4459,4 +6252,265 @@
     </a:ext>
   </a:extLst>
 </a:theme>
+</file>
+
+<file path=ppt/theme/theme2.xml><?xml version="1.0" encoding="utf-8"?>
+<a:theme xmlns:a="http://schemas.openxmlformats.org/drawingml/2006/main" name="Office">
+  <a:themeElements>
+    <a:clrScheme name="Office">
+      <a:dk1>
+        <a:sysClr val="windowText" lastClr="000000"/>
+      </a:dk1>
+      <a:lt1>
+        <a:sysClr val="window" lastClr="FFFFFF"/>
+      </a:lt1>
+      <a:dk2>
+        <a:srgbClr val="44546A"/>
+      </a:dk2>
+      <a:lt2>
+        <a:srgbClr val="E7E6E6"/>
+      </a:lt2>
+      <a:accent1>
+        <a:srgbClr val="5B9BD5"/>
+      </a:accent1>
+      <a:accent2>
+        <a:srgbClr val="ED7D31"/>
+      </a:accent2>
+      <a:accent3>
+        <a:srgbClr val="A5A5A5"/>
+      </a:accent3>
+      <a:accent4>
+        <a:srgbClr val="FFC000"/>
+      </a:accent4>
+      <a:accent5>
+        <a:srgbClr val="4472C4"/>
+      </a:accent5>
+      <a:accent6>
+        <a:srgbClr val="70AD47"/>
+      </a:accent6>
+      <a:hlink>
+        <a:srgbClr val="0563C1"/>
+      </a:hlink>
+      <a:folHlink>
+        <a:srgbClr val="954F72"/>
+      </a:folHlink>
+    </a:clrScheme>
+    <a:fontScheme name="Office">
+      <a:majorFont>
+        <a:latin typeface="Calibri Light" panose="020F0302020204030204"/>
+        <a:ea typeface=""/>
+        <a:cs typeface=""/>
+        <a:font script="Jpan" typeface="游ゴシック Light"/>
+        <a:font script="Hang" typeface="맑은 고딕"/>
+        <a:font script="Hans" typeface="等线 Light"/>
+        <a:font script="Hant" typeface="新細明體"/>
+        <a:font script="Arab" typeface="Times New Roman"/>
+        <a:font script="Hebr" typeface="Times New Roman"/>
+        <a:font script="Thai" typeface="Angsana New"/>
+        <a:font script="Ethi" typeface="Nyala"/>
+        <a:font script="Beng" typeface="Vrinda"/>
+        <a:font script="Gujr" typeface="Shruti"/>
+        <a:font script="Khmr" typeface="MoolBoran"/>
+        <a:font script="Knda" typeface="Tunga"/>
+        <a:font script="Guru" typeface="Raavi"/>
+        <a:font script="Cans" typeface="Euphemia"/>
+        <a:font script="Cher" typeface="Plantagenet Cherokee"/>
+        <a:font script="Yiii" typeface="Microsoft Yi Baiti"/>
+        <a:font script="Tibt" typeface="Microsoft Himalaya"/>
+        <a:font script="Thaa" typeface="MV Boli"/>
+        <a:font script="Deva" typeface="Mangal"/>
+        <a:font script="Telu" typeface="Gautami"/>
+        <a:font script="Taml" typeface="Latha"/>
+        <a:font script="Syrc" typeface="Estrangelo Edessa"/>
+        <a:font script="Orya" typeface="Kalinga"/>
+        <a:font script="Mlym" typeface="Kartika"/>
+        <a:font script="Laoo" typeface="DokChampa"/>
+        <a:font script="Sinh" typeface="Iskoola Pota"/>
+        <a:font script="Mong" typeface="Mongolian Baiti"/>
+        <a:font script="Viet" typeface="Times New Roman"/>
+        <a:font script="Uigh" typeface="Microsoft Uighur"/>
+        <a:font script="Geor" typeface="Sylfaen"/>
+      </a:majorFont>
+      <a:minorFont>
+        <a:latin typeface="Calibri" panose="020F0502020204030204"/>
+        <a:ea typeface=""/>
+        <a:cs typeface=""/>
+        <a:font script="Jpan" typeface="游ゴシック"/>
+        <a:font script="Hang" typeface="맑은 고딕"/>
+        <a:font script="Hans" typeface="等线"/>
+        <a:font script="Hant" typeface="新細明體"/>
+        <a:font script="Arab" typeface="Arial"/>
+        <a:font script="Hebr" typeface="Arial"/>
+        <a:font script="Thai" typeface="Cordia New"/>
+        <a:font script="Ethi" typeface="Nyala"/>
+        <a:font script="Beng" typeface="Vrinda"/>
+        <a:font script="Gujr" typeface="Shruti"/>
+        <a:font script="Khmr" typeface="DaunPenh"/>
+        <a:font script="Knda" typeface="Tunga"/>
+        <a:font script="Guru" typeface="Raavi"/>
+        <a:font script="Cans" typeface="Euphemia"/>
+        <a:font script="Cher" typeface="Plantagenet Cherokee"/>
+        <a:font script="Yiii" typeface="Microsoft Yi Baiti"/>
+        <a:font script="Tibt" typeface="Microsoft Himalaya"/>
+        <a:font script="Thaa" typeface="MV Boli"/>
+        <a:font script="Deva" typeface="Mangal"/>
+        <a:font script="Telu" typeface="Gautami"/>
+        <a:font script="Taml" typeface="Latha"/>
+        <a:font script="Syrc" typeface="Estrangelo Edessa"/>
+        <a:font script="Orya" typeface="Kalinga"/>
+        <a:font script="Mlym" typeface="Kartika"/>
+        <a:font script="Laoo" typeface="DokChampa"/>
+        <a:font script="Sinh" typeface="Iskoola Pota"/>
+        <a:font script="Mong" typeface="Mongolian Baiti"/>
+        <a:font script="Viet" typeface="Arial"/>
+        <a:font script="Uigh" typeface="Microsoft Uighur"/>
+        <a:font script="Geor" typeface="Sylfaen"/>
+      </a:minorFont>
+    </a:fontScheme>
+    <a:fmtScheme name="Office">
+      <a:fillStyleLst>
+        <a:solidFill>
+          <a:schemeClr val="phClr"/>
+        </a:solidFill>
+        <a:gradFill rotWithShape="1">
+          <a:gsLst>
+            <a:gs pos="0">
+              <a:schemeClr val="phClr">
+                <a:lumMod val="110000"/>
+                <a:satMod val="105000"/>
+                <a:tint val="67000"/>
+              </a:schemeClr>
+            </a:gs>
+            <a:gs pos="50000">
+              <a:schemeClr val="phClr">
+                <a:lumMod val="105000"/>
+                <a:satMod val="103000"/>
+                <a:tint val="73000"/>
+              </a:schemeClr>
+            </a:gs>
+            <a:gs pos="100000">
+              <a:schemeClr val="phClr">
+                <a:lumMod val="105000"/>
+                <a:satMod val="109000"/>
+                <a:tint val="81000"/>
+              </a:schemeClr>
+            </a:gs>
+          </a:gsLst>
+          <a:lin ang="5400000" scaled="0"/>
+        </a:gradFill>
+        <a:gradFill rotWithShape="1">
+          <a:gsLst>
+            <a:gs pos="0">
+              <a:schemeClr val="phClr">
+                <a:satMod val="103000"/>
+                <a:lumMod val="102000"/>
+                <a:tint val="94000"/>
+              </a:schemeClr>
+            </a:gs>
+            <a:gs pos="50000">
+              <a:schemeClr val="phClr">
+                <a:satMod val="110000"/>
+                <a:lumMod val="100000"/>
+                <a:shade val="100000"/>
+              </a:schemeClr>
+            </a:gs>
+            <a:gs pos="100000">
+              <a:schemeClr val="phClr">
+                <a:lumMod val="99000"/>
+                <a:satMod val="120000"/>
+                <a:shade val="78000"/>
+              </a:schemeClr>
+            </a:gs>
+          </a:gsLst>
+          <a:lin ang="5400000" scaled="0"/>
+        </a:gradFill>
+      </a:fillStyleLst>
+      <a:lnStyleLst>
+        <a:ln w="6350" cap="flat" cmpd="sng" algn="ctr">
+          <a:solidFill>
+            <a:schemeClr val="phClr"/>
+          </a:solidFill>
+          <a:prstDash val="solid"/>
+          <a:miter lim="800000"/>
+        </a:ln>
+        <a:ln w="12700" cap="flat" cmpd="sng" algn="ctr">
+          <a:solidFill>
+            <a:schemeClr val="phClr"/>
+          </a:solidFill>
+          <a:prstDash val="solid"/>
+          <a:miter lim="800000"/>
+        </a:ln>
+        <a:ln w="19050" cap="flat" cmpd="sng" algn="ctr">
+          <a:solidFill>
+            <a:schemeClr val="phClr"/>
+          </a:solidFill>
+          <a:prstDash val="solid"/>
+          <a:miter lim="800000"/>
+        </a:ln>
+      </a:lnStyleLst>
+      <a:effectStyleLst>
+        <a:effectStyle>
+          <a:effectLst/>
+        </a:effectStyle>
+        <a:effectStyle>
+          <a:effectLst/>
+        </a:effectStyle>
+        <a:effectStyle>
+          <a:effectLst>
+            <a:outerShdw blurRad="57150" dist="19050" dir="5400000" algn="ctr" rotWithShape="0">
+              <a:srgbClr val="000000">
+                <a:alpha val="63000"/>
+              </a:srgbClr>
+            </a:outerShdw>
+          </a:effectLst>
+        </a:effectStyle>
+      </a:effectStyleLst>
+      <a:bgFillStyleLst>
+        <a:solidFill>
+          <a:schemeClr val="phClr"/>
+        </a:solidFill>
+        <a:solidFill>
+          <a:schemeClr val="phClr">
+            <a:tint val="95000"/>
+            <a:satMod val="170000"/>
+          </a:schemeClr>
+        </a:solidFill>
+        <a:gradFill rotWithShape="1">
+          <a:gsLst>
+            <a:gs pos="0">
+              <a:schemeClr val="phClr">
+                <a:tint val="93000"/>
+                <a:satMod val="150000"/>
+                <a:shade val="98000"/>
+                <a:lumMod val="102000"/>
+              </a:schemeClr>
+            </a:gs>
+            <a:gs pos="50000">
+              <a:schemeClr val="phClr">
+                <a:tint val="98000"/>
+                <a:satMod val="130000"/>
+                <a:shade val="90000"/>
+                <a:lumMod val="103000"/>
+              </a:schemeClr>
+            </a:gs>
+            <a:gs pos="100000">
+              <a:schemeClr val="phClr">
+                <a:shade val="63000"/>
+                <a:satMod val="120000"/>
+              </a:schemeClr>
+            </a:gs>
+          </a:gsLst>
+          <a:lin ang="5400000" scaled="0"/>
+        </a:gradFill>
+      </a:bgFillStyleLst>
+    </a:fmtScheme>
+  </a:themeElements>
+  <a:objectDefaults/>
+  <a:extraClrSchemeLst/>
+  <a:extLst>
+    <a:ext uri="{05A4C25C-085E-4340-85A3-A5531E510DB2}">
+      <thm15:themeFamily xmlns:thm15="http://schemas.microsoft.com/office/thememl/2012/main" name="Office Theme" id="{62F939B6-93AF-4DB8-9C6B-D6C7DFDC589F}" vid="{4A3C46E8-61CC-4603-A589-7422A47A8E4A}"/>
+    </a:ext>
+  </a:extLst>
+</a:theme>
 </file>
</xml_diff>